<commit_message>
Updated with a few minor changes to formatting
</commit_message>
<xml_diff>
--- a/Paper/Insights using MySQL to explore Global Trade Item.pptx
+++ b/Paper/Insights using MySQL to explore Global Trade Item.pptx
@@ -5,7 +5,7 @@
     <p:sldMasterId id="2147483684" r:id="rId1"/>
   </p:sldMasterIdLst>
   <p:notesMasterIdLst>
-    <p:notesMasterId r:id="rId14"/>
+    <p:notesMasterId r:id="rId16"/>
   </p:notesMasterIdLst>
   <p:sldIdLst>
     <p:sldId id="256" r:id="rId2"/>
@@ -15,11 +15,13 @@
     <p:sldId id="269" r:id="rId6"/>
     <p:sldId id="267" r:id="rId7"/>
     <p:sldId id="270" r:id="rId8"/>
-    <p:sldId id="259" r:id="rId9"/>
-    <p:sldId id="261" r:id="rId10"/>
-    <p:sldId id="260" r:id="rId11"/>
-    <p:sldId id="257" r:id="rId12"/>
-    <p:sldId id="262" r:id="rId13"/>
+    <p:sldId id="272" r:id="rId9"/>
+    <p:sldId id="259" r:id="rId10"/>
+    <p:sldId id="261" r:id="rId11"/>
+    <p:sldId id="260" r:id="rId12"/>
+    <p:sldId id="257" r:id="rId13"/>
+    <p:sldId id="262" r:id="rId14"/>
+    <p:sldId id="271" r:id="rId15"/>
   </p:sldIdLst>
   <p:sldSz cx="9144000" cy="6858000" type="screen4x3"/>
   <p:notesSz cx="6858000" cy="9144000"/>
@@ -5747,7 +5749,7 @@
           <a:p>
             <a:fld id="{740B9C07-6A78-3041-8B0E-99BCA797EEE7}" type="datetimeFigureOut">
               <a:rPr lang="en-US" smtClean="0"/>
-              <a:t>12/8/2016</a:t>
+              <a:t>12/10/2016</a:t>
             </a:fld>
             <a:endParaRPr lang="en-US"/>
           </a:p>
@@ -6058,38 +6060,10 @@
           <a:bodyPr/>
           <a:lstStyle/>
           <a:p>
-            <a:pPr marL="0" marR="0" indent="0" algn="l" defTabSz="457200" rtl="0" eaLnBrk="1" fontAlgn="auto" latinLnBrk="0" hangingPunct="1">
-              <a:lnSpc>
-                <a:spcPct val="100000"/>
-              </a:lnSpc>
-              <a:spcBef>
-                <a:spcPts val="0"/>
-              </a:spcBef>
-              <a:spcAft>
-                <a:spcPts val="0"/>
-              </a:spcAft>
-              <a:buClrTx/>
-              <a:buSzTx/>
-              <a:buFontTx/>
-              <a:buNone/>
-              <a:tabLst/>
-              <a:defRPr/>
-            </a:pPr>
-            <a:r>
-              <a:rPr lang="en-US" sz="1200" kern="1200" dirty="0">
-                <a:solidFill>
-                  <a:schemeClr val="tx1"/>
-                </a:solidFill>
-                <a:effectLst/>
-                <a:latin typeface="+mn-lt"/>
-                <a:ea typeface="+mn-ea"/>
-                <a:cs typeface="+mn-cs"/>
-              </a:rPr>
-              <a:t>GS1 does not maintain a worldwide list of Global Trade Item numbers (GTIN), GS1 simply assigns Global Company Code prefixes to ensure unique GTIN values.  Each company using GTIN maintains their own list of item numbers and shares this with their trading partners.  There are several initiatives to create a global open source GTIN list. For this project the Product Open Data (POD) database was used.  This is far from a complete database in its current state, but does demonstrate the type of data linked to GTIN’s. </a:t>
-            </a:r>
-          </a:p>
-          <a:p>
-            <a:endParaRPr lang="en-US" dirty="0"/>
+            <a:r>
+              <a:rPr lang="en-US"/>
+              <a:t>Randy</a:t>
+            </a:r>
           </a:p>
         </p:txBody>
       </p:sp>
@@ -6110,7 +6084,7 @@
           <a:p>
             <a:fld id="{DDF3C980-D1D7-6F46-8183-EEE40974F22F}" type="slidenum">
               <a:rPr lang="en-US" smtClean="0"/>
-              <a:t>2</a:t>
+              <a:t>1</a:t>
             </a:fld>
             <a:endParaRPr lang="en-US"/>
           </a:p>
@@ -6119,7 +6093,339 @@
     </p:spTree>
     <p:extLst>
       <p:ext uri="{BB962C8B-B14F-4D97-AF65-F5344CB8AC3E}">
-        <p14:creationId xmlns:p14="http://schemas.microsoft.com/office/powerpoint/2010/main" val="1332949139"/>
+        <p14:creationId xmlns:p14="http://schemas.microsoft.com/office/powerpoint/2010/main" val="1465002896"/>
+      </p:ext>
+    </p:extLst>
+  </p:cSld>
+  <p:clrMapOvr>
+    <a:masterClrMapping/>
+  </p:clrMapOvr>
+</p:notes>
+</file>
+
+<file path=ppt/notesSlides/notesSlide10.xml><?xml version="1.0" encoding="utf-8"?>
+<p:notes xmlns:a="http://schemas.openxmlformats.org/drawingml/2006/main" xmlns:r="http://schemas.openxmlformats.org/officeDocument/2006/relationships" xmlns:p="http://schemas.openxmlformats.org/presentationml/2006/main">
+  <p:cSld>
+    <p:spTree>
+      <p:nvGrpSpPr>
+        <p:cNvPr id="1" name=""/>
+        <p:cNvGrpSpPr/>
+        <p:nvPr/>
+      </p:nvGrpSpPr>
+      <p:grpSpPr>
+        <a:xfrm>
+          <a:off x="0" y="0"/>
+          <a:ext cx="0" cy="0"/>
+          <a:chOff x="0" y="0"/>
+          <a:chExt cx="0" cy="0"/>
+        </a:xfrm>
+      </p:grpSpPr>
+      <p:sp>
+        <p:nvSpPr>
+          <p:cNvPr id="2" name="Slide Image Placeholder 1"/>
+          <p:cNvSpPr>
+            <a:spLocks noGrp="1" noRot="1" noChangeAspect="1"/>
+          </p:cNvSpPr>
+          <p:nvPr>
+            <p:ph type="sldImg"/>
+          </p:nvPr>
+        </p:nvSpPr>
+        <p:spPr/>
+      </p:sp>
+      <p:sp>
+        <p:nvSpPr>
+          <p:cNvPr id="3" name="Notes Placeholder 2"/>
+          <p:cNvSpPr>
+            <a:spLocks noGrp="1"/>
+          </p:cNvSpPr>
+          <p:nvPr>
+            <p:ph type="body" idx="1"/>
+          </p:nvPr>
+        </p:nvSpPr>
+        <p:spPr/>
+        <p:txBody>
+          <a:bodyPr/>
+          <a:lstStyle/>
+          <a:p>
+            <a:r>
+              <a:rPr lang="en-US"/>
+              <a:t>Randy</a:t>
+            </a:r>
+          </a:p>
+        </p:txBody>
+      </p:sp>
+      <p:sp>
+        <p:nvSpPr>
+          <p:cNvPr id="4" name="Slide Number Placeholder 3"/>
+          <p:cNvSpPr>
+            <a:spLocks noGrp="1"/>
+          </p:cNvSpPr>
+          <p:nvPr>
+            <p:ph type="sldNum" sz="quarter" idx="10"/>
+          </p:nvPr>
+        </p:nvSpPr>
+        <p:spPr/>
+        <p:txBody>
+          <a:bodyPr/>
+          <a:lstStyle/>
+          <a:p>
+            <a:fld id="{DDF3C980-D1D7-6F46-8183-EEE40974F22F}" type="slidenum">
+              <a:rPr lang="en-US" smtClean="0"/>
+              <a:t>11</a:t>
+            </a:fld>
+            <a:endParaRPr lang="en-US"/>
+          </a:p>
+        </p:txBody>
+      </p:sp>
+    </p:spTree>
+    <p:extLst>
+      <p:ext uri="{BB962C8B-B14F-4D97-AF65-F5344CB8AC3E}">
+        <p14:creationId xmlns:p14="http://schemas.microsoft.com/office/powerpoint/2010/main" val="888590614"/>
+      </p:ext>
+    </p:extLst>
+  </p:cSld>
+  <p:clrMapOvr>
+    <a:masterClrMapping/>
+  </p:clrMapOvr>
+</p:notes>
+</file>
+
+<file path=ppt/notesSlides/notesSlide11.xml><?xml version="1.0" encoding="utf-8"?>
+<p:notes xmlns:a="http://schemas.openxmlformats.org/drawingml/2006/main" xmlns:r="http://schemas.openxmlformats.org/officeDocument/2006/relationships" xmlns:p="http://schemas.openxmlformats.org/presentationml/2006/main">
+  <p:cSld>
+    <p:spTree>
+      <p:nvGrpSpPr>
+        <p:cNvPr id="1" name=""/>
+        <p:cNvGrpSpPr/>
+        <p:nvPr/>
+      </p:nvGrpSpPr>
+      <p:grpSpPr>
+        <a:xfrm>
+          <a:off x="0" y="0"/>
+          <a:ext cx="0" cy="0"/>
+          <a:chOff x="0" y="0"/>
+          <a:chExt cx="0" cy="0"/>
+        </a:xfrm>
+      </p:grpSpPr>
+      <p:sp>
+        <p:nvSpPr>
+          <p:cNvPr id="2" name="Slide Image Placeholder 1"/>
+          <p:cNvSpPr>
+            <a:spLocks noGrp="1" noRot="1" noChangeAspect="1"/>
+          </p:cNvSpPr>
+          <p:nvPr>
+            <p:ph type="sldImg"/>
+          </p:nvPr>
+        </p:nvSpPr>
+        <p:spPr/>
+      </p:sp>
+      <p:sp>
+        <p:nvSpPr>
+          <p:cNvPr id="3" name="Notes Placeholder 2"/>
+          <p:cNvSpPr>
+            <a:spLocks noGrp="1"/>
+          </p:cNvSpPr>
+          <p:nvPr>
+            <p:ph type="body" idx="1"/>
+          </p:nvPr>
+        </p:nvSpPr>
+        <p:spPr/>
+        <p:txBody>
+          <a:bodyPr/>
+          <a:lstStyle/>
+          <a:p>
+            <a:r>
+              <a:rPr lang="en-US"/>
+              <a:t>Randy</a:t>
+            </a:r>
+          </a:p>
+        </p:txBody>
+      </p:sp>
+      <p:sp>
+        <p:nvSpPr>
+          <p:cNvPr id="4" name="Slide Number Placeholder 3"/>
+          <p:cNvSpPr>
+            <a:spLocks noGrp="1"/>
+          </p:cNvSpPr>
+          <p:nvPr>
+            <p:ph type="sldNum" sz="quarter" idx="10"/>
+          </p:nvPr>
+        </p:nvSpPr>
+        <p:spPr/>
+        <p:txBody>
+          <a:bodyPr/>
+          <a:lstStyle/>
+          <a:p>
+            <a:fld id="{DDF3C980-D1D7-6F46-8183-EEE40974F22F}" type="slidenum">
+              <a:rPr lang="en-US" smtClean="0"/>
+              <a:t>12</a:t>
+            </a:fld>
+            <a:endParaRPr lang="en-US"/>
+          </a:p>
+        </p:txBody>
+      </p:sp>
+    </p:spTree>
+    <p:extLst>
+      <p:ext uri="{BB962C8B-B14F-4D97-AF65-F5344CB8AC3E}">
+        <p14:creationId xmlns:p14="http://schemas.microsoft.com/office/powerpoint/2010/main" val="3310166542"/>
+      </p:ext>
+    </p:extLst>
+  </p:cSld>
+  <p:clrMapOvr>
+    <a:masterClrMapping/>
+  </p:clrMapOvr>
+</p:notes>
+</file>
+
+<file path=ppt/notesSlides/notesSlide12.xml><?xml version="1.0" encoding="utf-8"?>
+<p:notes xmlns:a="http://schemas.openxmlformats.org/drawingml/2006/main" xmlns:r="http://schemas.openxmlformats.org/officeDocument/2006/relationships" xmlns:p="http://schemas.openxmlformats.org/presentationml/2006/main">
+  <p:cSld>
+    <p:spTree>
+      <p:nvGrpSpPr>
+        <p:cNvPr id="1" name=""/>
+        <p:cNvGrpSpPr/>
+        <p:nvPr/>
+      </p:nvGrpSpPr>
+      <p:grpSpPr>
+        <a:xfrm>
+          <a:off x="0" y="0"/>
+          <a:ext cx="0" cy="0"/>
+          <a:chOff x="0" y="0"/>
+          <a:chExt cx="0" cy="0"/>
+        </a:xfrm>
+      </p:grpSpPr>
+      <p:sp>
+        <p:nvSpPr>
+          <p:cNvPr id="2" name="Slide Image Placeholder 1"/>
+          <p:cNvSpPr>
+            <a:spLocks noGrp="1" noRot="1" noChangeAspect="1"/>
+          </p:cNvSpPr>
+          <p:nvPr>
+            <p:ph type="sldImg"/>
+          </p:nvPr>
+        </p:nvSpPr>
+        <p:spPr/>
+      </p:sp>
+      <p:sp>
+        <p:nvSpPr>
+          <p:cNvPr id="3" name="Notes Placeholder 2"/>
+          <p:cNvSpPr>
+            <a:spLocks noGrp="1"/>
+          </p:cNvSpPr>
+          <p:nvPr>
+            <p:ph type="body" idx="1"/>
+          </p:nvPr>
+        </p:nvSpPr>
+        <p:spPr/>
+        <p:txBody>
+          <a:bodyPr/>
+          <a:lstStyle/>
+          <a:p>
+            <a:r>
+              <a:rPr lang="en-US" sz="1200" kern="1200">
+                <a:solidFill>
+                  <a:schemeClr val="tx1"/>
+                </a:solidFill>
+                <a:effectLst/>
+                <a:latin typeface="+mn-lt"/>
+                <a:ea typeface="+mn-ea"/>
+                <a:cs typeface="+mn-cs"/>
+              </a:rPr>
+              <a:t>Randy</a:t>
+            </a:r>
+          </a:p>
+          <a:p>
+            <a:endParaRPr lang="en-US" sz="1200" kern="1200">
+              <a:solidFill>
+                <a:schemeClr val="tx1"/>
+              </a:solidFill>
+              <a:effectLst/>
+              <a:latin typeface="+mn-lt"/>
+              <a:ea typeface="+mn-ea"/>
+              <a:cs typeface="+mn-cs"/>
+            </a:endParaRPr>
+          </a:p>
+          <a:p>
+            <a:r>
+              <a:rPr lang="en-US" sz="1200" kern="1200">
+                <a:solidFill>
+                  <a:schemeClr val="tx1"/>
+                </a:solidFill>
+                <a:effectLst/>
+                <a:latin typeface="+mn-lt"/>
+                <a:ea typeface="+mn-ea"/>
+                <a:cs typeface="+mn-cs"/>
+              </a:rPr>
+              <a:t>Without </a:t>
+            </a:r>
+            <a:r>
+              <a:rPr lang="en-US" sz="1200" kern="1200" dirty="0">
+                <a:solidFill>
+                  <a:schemeClr val="tx1"/>
+                </a:solidFill>
+                <a:effectLst/>
+                <a:latin typeface="+mn-lt"/>
+                <a:ea typeface="+mn-ea"/>
+                <a:cs typeface="+mn-cs"/>
+              </a:rPr>
+              <a:t>Global Company Prefixes and Global Trade item numbers, it would be possible and highly likely that different companies could choose to use the same identification number (Part number) on their products.  It is hard to imagine how global trade would work without Global Trade Item Numbers and the GS1 organization in place to ensure a unique numbering system worldwide.  GS1 does not maintain a list of global trade item numbers, they just maintain the Global Company Prefixes used to ensure unique item numbers.  The Product Open Database (POD) gave an interesting peak into the detailed data related to GTIN, but it’s small size and fractured nature were disappointing.</a:t>
+            </a:r>
+          </a:p>
+          <a:p>
+            <a:endParaRPr lang="en-US" sz="1200" kern="1200" dirty="0">
+              <a:solidFill>
+                <a:schemeClr val="tx1"/>
+              </a:solidFill>
+              <a:effectLst/>
+              <a:latin typeface="+mn-lt"/>
+              <a:ea typeface="+mn-ea"/>
+              <a:cs typeface="+mn-cs"/>
+            </a:endParaRPr>
+          </a:p>
+          <a:p>
+            <a:r>
+              <a:rPr lang="en-US" sz="1200" kern="1200" dirty="0">
+                <a:solidFill>
+                  <a:schemeClr val="tx1"/>
+                </a:solidFill>
+                <a:effectLst/>
+                <a:latin typeface="+mn-lt"/>
+                <a:ea typeface="+mn-ea"/>
+                <a:cs typeface="+mn-cs"/>
+              </a:rPr>
+              <a:t>There are several other “Open” implementations of Global Trade Item numbers.  See Appendix A, table A2.  POD first appeared to be a complete subset but after further investigation it was found to be missing enough linked records in related tables to be very useful. </a:t>
+            </a:r>
+            <a:endParaRPr lang="en-US" dirty="0"/>
+          </a:p>
+        </p:txBody>
+      </p:sp>
+      <p:sp>
+        <p:nvSpPr>
+          <p:cNvPr id="4" name="Slide Number Placeholder 3"/>
+          <p:cNvSpPr>
+            <a:spLocks noGrp="1"/>
+          </p:cNvSpPr>
+          <p:nvPr>
+            <p:ph type="sldNum" sz="quarter" idx="10"/>
+          </p:nvPr>
+        </p:nvSpPr>
+        <p:spPr/>
+        <p:txBody>
+          <a:bodyPr/>
+          <a:lstStyle/>
+          <a:p>
+            <a:fld id="{DDF3C980-D1D7-6F46-8183-EEE40974F22F}" type="slidenum">
+              <a:rPr lang="en-US" smtClean="0"/>
+              <a:t>13</a:t>
+            </a:fld>
+            <a:endParaRPr lang="en-US"/>
+          </a:p>
+        </p:txBody>
+      </p:sp>
+    </p:spTree>
+    <p:extLst>
+      <p:ext uri="{BB962C8B-B14F-4D97-AF65-F5344CB8AC3E}">
+        <p14:creationId xmlns:p14="http://schemas.microsoft.com/office/powerpoint/2010/main" val="3214448215"/>
       </p:ext>
     </p:extLst>
   </p:cSld>
@@ -6173,10 +6479,109 @@
           <a:bodyPr/>
           <a:lstStyle/>
           <a:p>
-            <a:r>
-              <a:rPr lang="en-US" dirty="0"/>
-              <a:t>GTIN(Global Trade Item Number is just one of the numbering systems managed by GS1. </a:t>
-            </a:r>
+            <a:pPr marL="0" marR="0" indent="0" algn="l" defTabSz="457200" rtl="0" eaLnBrk="1" fontAlgn="auto" latinLnBrk="0" hangingPunct="1">
+              <a:lnSpc>
+                <a:spcPct val="100000"/>
+              </a:lnSpc>
+              <a:spcBef>
+                <a:spcPts val="0"/>
+              </a:spcBef>
+              <a:spcAft>
+                <a:spcPts val="0"/>
+              </a:spcAft>
+              <a:buClrTx/>
+              <a:buSzTx/>
+              <a:buFontTx/>
+              <a:buNone/>
+              <a:tabLst/>
+              <a:defRPr/>
+            </a:pPr>
+            <a:r>
+              <a:rPr lang="en-US" sz="1200" kern="1200">
+                <a:solidFill>
+                  <a:schemeClr val="tx1"/>
+                </a:solidFill>
+                <a:effectLst/>
+                <a:latin typeface="+mn-lt"/>
+                <a:ea typeface="+mn-ea"/>
+                <a:cs typeface="+mn-cs"/>
+              </a:rPr>
+              <a:t>Randy</a:t>
+            </a:r>
+          </a:p>
+          <a:p>
+            <a:pPr marL="0" marR="0" indent="0" algn="l" defTabSz="457200" rtl="0" eaLnBrk="1" fontAlgn="auto" latinLnBrk="0" hangingPunct="1">
+              <a:lnSpc>
+                <a:spcPct val="100000"/>
+              </a:lnSpc>
+              <a:spcBef>
+                <a:spcPts val="0"/>
+              </a:spcBef>
+              <a:spcAft>
+                <a:spcPts val="0"/>
+              </a:spcAft>
+              <a:buClrTx/>
+              <a:buSzTx/>
+              <a:buFontTx/>
+              <a:buNone/>
+              <a:tabLst/>
+              <a:defRPr/>
+            </a:pPr>
+            <a:endParaRPr lang="en-US" sz="1200" kern="1200">
+              <a:solidFill>
+                <a:schemeClr val="tx1"/>
+              </a:solidFill>
+              <a:effectLst/>
+              <a:latin typeface="+mn-lt"/>
+              <a:ea typeface="+mn-ea"/>
+              <a:cs typeface="+mn-cs"/>
+            </a:endParaRPr>
+          </a:p>
+          <a:p>
+            <a:pPr marL="0" marR="0" indent="0" algn="l" defTabSz="457200" rtl="0" eaLnBrk="1" fontAlgn="auto" latinLnBrk="0" hangingPunct="1">
+              <a:lnSpc>
+                <a:spcPct val="100000"/>
+              </a:lnSpc>
+              <a:spcBef>
+                <a:spcPts val="0"/>
+              </a:spcBef>
+              <a:spcAft>
+                <a:spcPts val="0"/>
+              </a:spcAft>
+              <a:buClrTx/>
+              <a:buSzTx/>
+              <a:buFontTx/>
+              <a:buNone/>
+              <a:tabLst/>
+              <a:defRPr/>
+            </a:pPr>
+            <a:r>
+              <a:rPr lang="en-US" sz="1200" kern="1200">
+                <a:solidFill>
+                  <a:schemeClr val="tx1"/>
+                </a:solidFill>
+                <a:effectLst/>
+                <a:latin typeface="+mn-lt"/>
+                <a:ea typeface="+mn-ea"/>
+                <a:cs typeface="+mn-cs"/>
+              </a:rPr>
+              <a:t>GS1 </a:t>
+            </a:r>
+            <a:r>
+              <a:rPr lang="en-US" sz="1200" kern="1200" dirty="0">
+                <a:solidFill>
+                  <a:schemeClr val="tx1"/>
+                </a:solidFill>
+                <a:effectLst/>
+                <a:latin typeface="+mn-lt"/>
+                <a:ea typeface="+mn-ea"/>
+                <a:cs typeface="+mn-cs"/>
+              </a:rPr>
+              <a:t>does not maintain a worldwide list of Global Trade Item numbers (GTIN), GS1 simply assigns Global Company Code prefixes to ensure unique GTIN values.  Each company using GTIN maintains their own list of item numbers and shares this with their trading partners.  There are several initiatives to create a global open source GTIN list. For this project the Product Open Data (POD) database was used.  This is far from a complete database in its current state, but does demonstrate the type of data linked to GTIN’s. </a:t>
+            </a:r>
+          </a:p>
+          <a:p>
+            <a:endParaRPr lang="en-US" dirty="0"/>
           </a:p>
         </p:txBody>
       </p:sp>
@@ -6197,7 +6602,7 @@
           <a:p>
             <a:fld id="{DDF3C980-D1D7-6F46-8183-EEE40974F22F}" type="slidenum">
               <a:rPr lang="en-US" smtClean="0"/>
-              <a:t>3</a:t>
+              <a:t>2</a:t>
             </a:fld>
             <a:endParaRPr lang="en-US"/>
           </a:p>
@@ -6206,7 +6611,7 @@
     </p:spTree>
     <p:extLst>
       <p:ext uri="{BB962C8B-B14F-4D97-AF65-F5344CB8AC3E}">
-        <p14:creationId xmlns:p14="http://schemas.microsoft.com/office/powerpoint/2010/main" val="4177528011"/>
+        <p14:creationId xmlns:p14="http://schemas.microsoft.com/office/powerpoint/2010/main" val="1332949139"/>
       </p:ext>
     </p:extLst>
   </p:cSld>
@@ -6260,212 +6665,23 @@
           <a:bodyPr/>
           <a:lstStyle/>
           <a:p>
-            <a:pPr marL="0" marR="0" indent="0" algn="l" defTabSz="457200" rtl="0" eaLnBrk="1" fontAlgn="auto" latinLnBrk="0" hangingPunct="1">
-              <a:lnSpc>
-                <a:spcPct val="100000"/>
-              </a:lnSpc>
-              <a:spcBef>
-                <a:spcPts val="0"/>
-              </a:spcBef>
-              <a:spcAft>
-                <a:spcPts val="0"/>
-              </a:spcAft>
-              <a:buClrTx/>
-              <a:buSzTx/>
-              <a:buFontTx/>
-              <a:buNone/>
-              <a:tabLst/>
-              <a:defRPr/>
-            </a:pPr>
-            <a:r>
-              <a:rPr lang="en-US" sz="1200" kern="1200" dirty="0">
-                <a:solidFill>
-                  <a:schemeClr val="tx1"/>
-                </a:solidFill>
-                <a:effectLst/>
-                <a:latin typeface="+mn-lt"/>
-                <a:ea typeface="+mn-ea"/>
-                <a:cs typeface="+mn-cs"/>
-              </a:rPr>
-              <a:t>Global Trade Item Number( GTIN) is a number that uniquely identifies trade items as they move through the global supply chain. It is a well-established standard for every country around the world for trade items. Uniqueness and data quality are two key attributes of a GTIN number that ensure all trade items are identify correctly anywhere in the world. There are rules in assigning each number with a standardized format and structure to ensure that every variation of an item is allocated a single number that is globally unique. GTIN simplifies supply chain management and provides accuracy, speed, and efficiency for business. </a:t>
-            </a:r>
-          </a:p>
-          <a:p>
-            <a:pPr marL="0" marR="0" indent="0" algn="l" defTabSz="457200" rtl="0" eaLnBrk="1" fontAlgn="auto" latinLnBrk="0" hangingPunct="1">
-              <a:lnSpc>
-                <a:spcPct val="100000"/>
-              </a:lnSpc>
-              <a:spcBef>
-                <a:spcPts val="0"/>
-              </a:spcBef>
-              <a:spcAft>
-                <a:spcPts val="0"/>
-              </a:spcAft>
-              <a:buClrTx/>
-              <a:buSzTx/>
-              <a:buFontTx/>
-              <a:buNone/>
-              <a:tabLst/>
-              <a:defRPr/>
-            </a:pPr>
-            <a:endParaRPr lang="en-US" dirty="0"/>
-          </a:p>
-          <a:p>
-            <a:pPr marL="0" marR="0" indent="0" algn="l" defTabSz="457200" rtl="0" eaLnBrk="1" fontAlgn="auto" latinLnBrk="0" hangingPunct="1">
-              <a:lnSpc>
-                <a:spcPct val="100000"/>
-              </a:lnSpc>
-              <a:spcBef>
-                <a:spcPts val="0"/>
-              </a:spcBef>
-              <a:spcAft>
-                <a:spcPts val="0"/>
-              </a:spcAft>
-              <a:buClrTx/>
-              <a:buSzTx/>
-              <a:buFontTx/>
-              <a:buNone/>
-              <a:tabLst/>
-              <a:defRPr/>
-            </a:pPr>
-            <a:endParaRPr lang="en-US" dirty="0"/>
-          </a:p>
-          <a:p>
-            <a:pPr marL="0" marR="0" indent="0" algn="l" defTabSz="457200" rtl="0" eaLnBrk="1" fontAlgn="auto" latinLnBrk="0" hangingPunct="1">
-              <a:lnSpc>
-                <a:spcPct val="100000"/>
-              </a:lnSpc>
-              <a:spcBef>
-                <a:spcPts val="0"/>
-              </a:spcBef>
-              <a:spcAft>
-                <a:spcPts val="0"/>
-              </a:spcAft>
-              <a:buClrTx/>
-              <a:buSzTx/>
-              <a:buFontTx/>
-              <a:buNone/>
-              <a:tabLst/>
-              <a:defRPr/>
-            </a:pPr>
-            <a:r>
-              <a:rPr lang="en-US" sz="1200" kern="1200" dirty="0">
-                <a:solidFill>
-                  <a:schemeClr val="tx1"/>
-                </a:solidFill>
-                <a:effectLst/>
-                <a:latin typeface="+mn-lt"/>
-                <a:ea typeface="+mn-ea"/>
-                <a:cs typeface="+mn-cs"/>
-              </a:rPr>
-              <a:t>From</a:t>
-            </a:r>
-            <a:r>
-              <a:rPr lang="en-US" sz="1200" kern="1200" baseline="0" dirty="0">
-                <a:solidFill>
-                  <a:schemeClr val="tx1"/>
-                </a:solidFill>
-                <a:effectLst/>
-                <a:latin typeface="+mn-lt"/>
-                <a:ea typeface="+mn-ea"/>
-                <a:cs typeface="+mn-cs"/>
-              </a:rPr>
-              <a:t> this chart you can see that </a:t>
-            </a:r>
-            <a:r>
-              <a:rPr lang="en-US" sz="1200" kern="1200" dirty="0">
-                <a:solidFill>
-                  <a:schemeClr val="tx1"/>
-                </a:solidFill>
-                <a:effectLst/>
-                <a:latin typeface="+mn-lt"/>
-                <a:ea typeface="+mn-ea"/>
-                <a:cs typeface="+mn-cs"/>
-              </a:rPr>
-              <a:t>A GTIN consists of four parts, an optional Application Identifier, the Company Prefix, the Item Reference, and a check digit.  Notice that price is not in the GTIN, the GTIN is used to lookup product price in an external database. </a:t>
-            </a:r>
-            <a:endParaRPr lang="en-US" dirty="0"/>
-          </a:p>
-          <a:p>
-            <a:endParaRPr lang="en-US" dirty="0"/>
-          </a:p>
-          <a:p>
-            <a:pPr lvl="0"/>
-            <a:r>
-              <a:rPr lang="en-US" sz="1200" kern="1200" dirty="0">
-                <a:solidFill>
-                  <a:schemeClr val="tx1"/>
-                </a:solidFill>
-                <a:effectLst/>
-                <a:latin typeface="+mn-lt"/>
-                <a:ea typeface="+mn-ea"/>
-                <a:cs typeface="+mn-cs"/>
-              </a:rPr>
-              <a:t>GTIN-8 is a truncated 8 digit GSI identification key used on packages with limited label space, such as chewing gum.</a:t>
-            </a:r>
-          </a:p>
-          <a:p>
-            <a:pPr lvl="0"/>
-            <a:r>
-              <a:rPr lang="en-US" sz="1200" kern="1200" dirty="0">
-                <a:solidFill>
-                  <a:schemeClr val="tx1"/>
-                </a:solidFill>
-                <a:effectLst/>
-                <a:latin typeface="+mn-lt"/>
-                <a:ea typeface="+mn-ea"/>
-                <a:cs typeface="+mn-cs"/>
-              </a:rPr>
-              <a:t>GTIN-12 is 12 digit GSI identification key consisting of a U.P.C. company prefix, item reference, and check digit.</a:t>
-            </a:r>
-          </a:p>
-          <a:p>
-            <a:pPr lvl="0"/>
-            <a:r>
-              <a:rPr lang="en-US" sz="1200" kern="1200" dirty="0">
-                <a:solidFill>
-                  <a:schemeClr val="tx1"/>
-                </a:solidFill>
-                <a:effectLst/>
-                <a:latin typeface="+mn-lt"/>
-                <a:ea typeface="+mn-ea"/>
-                <a:cs typeface="+mn-cs"/>
-              </a:rPr>
-              <a:t>GTIN-13 is a 13 digit GSI identification key consisting of a GS1 Company prefix, item reference, and check digit</a:t>
-            </a:r>
-          </a:p>
-          <a:p>
-            <a:r>
-              <a:rPr lang="en-US" sz="1200" kern="1200" dirty="0">
-                <a:solidFill>
-                  <a:schemeClr val="tx1"/>
-                </a:solidFill>
-                <a:effectLst/>
-                <a:latin typeface="+mn-lt"/>
-                <a:ea typeface="+mn-ea"/>
-                <a:cs typeface="+mn-cs"/>
-              </a:rPr>
-              <a:t>GTIN-14 is a 14 digit GSI identification key consisting of an indicator digit (1-9), GS1 company prefix, item key, and check digit.</a:t>
-            </a:r>
-            <a:r>
-              <a:rPr lang="en-US" dirty="0">
-                <a:effectLst/>
-              </a:rPr>
-              <a:t> </a:t>
-            </a:r>
-          </a:p>
-          <a:p>
-            <a:endParaRPr lang="en-US" dirty="0">
-              <a:effectLst/>
-            </a:endParaRPr>
-          </a:p>
-          <a:p>
-            <a:endParaRPr lang="en-US" dirty="0">
-              <a:effectLst/>
-            </a:endParaRPr>
-          </a:p>
-          <a:p>
-            <a:endParaRPr lang="en-US" dirty="0"/>
+            <a:r>
+              <a:rPr lang="en-US"/>
+              <a:t>Marvin</a:t>
+            </a:r>
+          </a:p>
+          <a:p>
+            <a:endParaRPr lang="en-US"/>
+          </a:p>
+          <a:p>
+            <a:r>
+              <a:rPr lang="en-US"/>
+              <a:t>GTIN(Global </a:t>
+            </a:r>
+            <a:r>
+              <a:rPr lang="en-US" dirty="0"/>
+              <a:t>Trade Item Number is just one of the numbering systems managed by GS1. </a:t>
+            </a:r>
           </a:p>
         </p:txBody>
       </p:sp>
@@ -6486,7 +6702,7 @@
           <a:p>
             <a:fld id="{DDF3C980-D1D7-6F46-8183-EEE40974F22F}" type="slidenum">
               <a:rPr lang="en-US" smtClean="0"/>
-              <a:t>4</a:t>
+              <a:t>3</a:t>
             </a:fld>
             <a:endParaRPr lang="en-US"/>
           </a:p>
@@ -6567,7 +6783,7 @@
               <a:defRPr/>
             </a:pPr>
             <a:r>
-              <a:rPr lang="en-US" sz="1200" kern="1200" dirty="0">
+              <a:rPr lang="en-US" sz="1200" kern="1200">
                 <a:solidFill>
                   <a:schemeClr val="tx1"/>
                 </a:solidFill>
@@ -6576,7 +6792,7 @@
                 <a:ea typeface="+mn-ea"/>
                 <a:cs typeface="+mn-cs"/>
               </a:rPr>
-              <a:t>The Indicator Prefix Digit is used to define a grouping, or packaging level.  For instance, in Figure 2, [1] we see an example GTIN of 061414112345, let’s say this was a 2oz bag of candy corn.  Adding an indicator prefix of “1” could denote a bulk pack of 12 2oz packages, indicator prefix “2” could be used for a 24 pack, indicator prefix “3” could be a “Gross” pack (144) of 2oz candy corn packages, and so on.  If more than 8 packaging levels are needed, then a new GTIN-12 or GTIN-13 is required.  </a:t>
+              <a:t>Vinh</a:t>
             </a:r>
           </a:p>
           <a:p>
@@ -6597,7 +6813,7 @@
               <a:tabLst/>
               <a:defRPr/>
             </a:pPr>
-            <a:endParaRPr lang="en-US" sz="1200" kern="1200" dirty="0">
+            <a:endParaRPr lang="en-US" sz="1200" kern="1200">
               <a:solidFill>
                 <a:schemeClr val="tx1"/>
               </a:solidFill>
@@ -6626,6 +6842,18 @@
               <a:defRPr/>
             </a:pPr>
             <a:r>
+              <a:rPr lang="en-US" sz="1200" kern="1200">
+                <a:solidFill>
+                  <a:schemeClr val="tx1"/>
+                </a:solidFill>
+                <a:effectLst/>
+                <a:latin typeface="+mn-lt"/>
+                <a:ea typeface="+mn-ea"/>
+                <a:cs typeface="+mn-cs"/>
+              </a:rPr>
+              <a:t>Global </a:t>
+            </a:r>
+            <a:r>
               <a:rPr lang="en-US" sz="1200" kern="1200" dirty="0">
                 <a:solidFill>
                   <a:schemeClr val="tx1"/>
@@ -6635,7 +6863,7 @@
                 <a:ea typeface="+mn-ea"/>
                 <a:cs typeface="+mn-cs"/>
               </a:rPr>
-              <a:t>Indicator prefix “9” is reserved for variable measure trade items.  Variable measure items are trade items that cannot guarantee consistent weight, size, or length due to the production process (e.g. meat, bulk cheese).</a:t>
+              <a:t>Trade Item Number( GTIN) is a number that uniquely identifies trade items as they move through the global supply chain. It is a well-established standard for every country around the world for trade items. Uniqueness and data quality are two key attributes of a GTIN number that ensure all trade items are identify correctly anywhere in the world. There are rules in assigning each number with a standardized format and structure to ensure that every variation of an item is allocated a single number that is globally unique. GTIN simplifies supply chain management and provides accuracy, speed, and efficiency for business. </a:t>
             </a:r>
           </a:p>
           <a:p>
@@ -6656,14 +6884,160 @@
               <a:tabLst/>
               <a:defRPr/>
             </a:pPr>
-            <a:endParaRPr lang="en-US" sz="1200" kern="1200" dirty="0">
-              <a:solidFill>
-                <a:schemeClr val="tx1"/>
-              </a:solidFill>
+            <a:endParaRPr lang="en-US" dirty="0"/>
+          </a:p>
+          <a:p>
+            <a:pPr marL="0" marR="0" indent="0" algn="l" defTabSz="457200" rtl="0" eaLnBrk="1" fontAlgn="auto" latinLnBrk="0" hangingPunct="1">
+              <a:lnSpc>
+                <a:spcPct val="100000"/>
+              </a:lnSpc>
+              <a:spcBef>
+                <a:spcPts val="0"/>
+              </a:spcBef>
+              <a:spcAft>
+                <a:spcPts val="0"/>
+              </a:spcAft>
+              <a:buClrTx/>
+              <a:buSzTx/>
+              <a:buFontTx/>
+              <a:buNone/>
+              <a:tabLst/>
+              <a:defRPr/>
+            </a:pPr>
+            <a:endParaRPr lang="en-US" dirty="0"/>
+          </a:p>
+          <a:p>
+            <a:pPr marL="0" marR="0" indent="0" algn="l" defTabSz="457200" rtl="0" eaLnBrk="1" fontAlgn="auto" latinLnBrk="0" hangingPunct="1">
+              <a:lnSpc>
+                <a:spcPct val="100000"/>
+              </a:lnSpc>
+              <a:spcBef>
+                <a:spcPts val="0"/>
+              </a:spcBef>
+              <a:spcAft>
+                <a:spcPts val="0"/>
+              </a:spcAft>
+              <a:buClrTx/>
+              <a:buSzTx/>
+              <a:buFontTx/>
+              <a:buNone/>
+              <a:tabLst/>
+              <a:defRPr/>
+            </a:pPr>
+            <a:r>
+              <a:rPr lang="en-US" sz="1200" kern="1200" dirty="0">
+                <a:solidFill>
+                  <a:schemeClr val="tx1"/>
+                </a:solidFill>
+                <a:effectLst/>
+                <a:latin typeface="+mn-lt"/>
+                <a:ea typeface="+mn-ea"/>
+                <a:cs typeface="+mn-cs"/>
+              </a:rPr>
+              <a:t>From</a:t>
+            </a:r>
+            <a:r>
+              <a:rPr lang="en-US" sz="1200" kern="1200" baseline="0" dirty="0">
+                <a:solidFill>
+                  <a:schemeClr val="tx1"/>
+                </a:solidFill>
+                <a:effectLst/>
+                <a:latin typeface="+mn-lt"/>
+                <a:ea typeface="+mn-ea"/>
+                <a:cs typeface="+mn-cs"/>
+              </a:rPr>
+              <a:t> this chart you can see that </a:t>
+            </a:r>
+            <a:r>
+              <a:rPr lang="en-US" sz="1200" kern="1200" dirty="0">
+                <a:solidFill>
+                  <a:schemeClr val="tx1"/>
+                </a:solidFill>
+                <a:effectLst/>
+                <a:latin typeface="+mn-lt"/>
+                <a:ea typeface="+mn-ea"/>
+                <a:cs typeface="+mn-cs"/>
+              </a:rPr>
+              <a:t>A GTIN consists of four parts, an optional Application Identifier, the Company Prefix, the Item Reference, and a check digit.  Notice that price is not in the GTIN, the GTIN is used to lookup product price in an external database. </a:t>
+            </a:r>
+            <a:endParaRPr lang="en-US" dirty="0"/>
+          </a:p>
+          <a:p>
+            <a:endParaRPr lang="en-US" dirty="0"/>
+          </a:p>
+          <a:p>
+            <a:pPr lvl="0"/>
+            <a:r>
+              <a:rPr lang="en-US" sz="1200" kern="1200" dirty="0">
+                <a:solidFill>
+                  <a:schemeClr val="tx1"/>
+                </a:solidFill>
+                <a:effectLst/>
+                <a:latin typeface="+mn-lt"/>
+                <a:ea typeface="+mn-ea"/>
+                <a:cs typeface="+mn-cs"/>
+              </a:rPr>
+              <a:t>GTIN-8 is a truncated 8 digit GSI identification key used on packages with limited label space, such as chewing gum.</a:t>
+            </a:r>
+          </a:p>
+          <a:p>
+            <a:pPr lvl="0"/>
+            <a:r>
+              <a:rPr lang="en-US" sz="1200" kern="1200" dirty="0">
+                <a:solidFill>
+                  <a:schemeClr val="tx1"/>
+                </a:solidFill>
+                <a:effectLst/>
+                <a:latin typeface="+mn-lt"/>
+                <a:ea typeface="+mn-ea"/>
+                <a:cs typeface="+mn-cs"/>
+              </a:rPr>
+              <a:t>GTIN-12 is 12 digit GSI identification key consisting of a U.P.C. company prefix, item reference, and check digit.</a:t>
+            </a:r>
+          </a:p>
+          <a:p>
+            <a:pPr lvl="0"/>
+            <a:r>
+              <a:rPr lang="en-US" sz="1200" kern="1200" dirty="0">
+                <a:solidFill>
+                  <a:schemeClr val="tx1"/>
+                </a:solidFill>
+                <a:effectLst/>
+                <a:latin typeface="+mn-lt"/>
+                <a:ea typeface="+mn-ea"/>
+                <a:cs typeface="+mn-cs"/>
+              </a:rPr>
+              <a:t>GTIN-13 is a 13 digit GSI identification key consisting of a GS1 Company prefix, item reference, and check digit</a:t>
+            </a:r>
+          </a:p>
+          <a:p>
+            <a:r>
+              <a:rPr lang="en-US" sz="1200" kern="1200" dirty="0">
+                <a:solidFill>
+                  <a:schemeClr val="tx1"/>
+                </a:solidFill>
+                <a:effectLst/>
+                <a:latin typeface="+mn-lt"/>
+                <a:ea typeface="+mn-ea"/>
+                <a:cs typeface="+mn-cs"/>
+              </a:rPr>
+              <a:t>GTIN-14 is a 14 digit GSI identification key consisting of an indicator digit (1-9), GS1 company prefix, item key, and check digit.</a:t>
+            </a:r>
+            <a:r>
+              <a:rPr lang="en-US" dirty="0">
+                <a:effectLst/>
+              </a:rPr>
+              <a:t> </a:t>
+            </a:r>
+          </a:p>
+          <a:p>
+            <a:endParaRPr lang="en-US" dirty="0">
               <a:effectLst/>
-              <a:latin typeface="+mn-lt"/>
-              <a:ea typeface="+mn-ea"/>
-              <a:cs typeface="+mn-cs"/>
+            </a:endParaRPr>
+          </a:p>
+          <a:p>
+            <a:endParaRPr lang="en-US" dirty="0">
+              <a:effectLst/>
             </a:endParaRPr>
           </a:p>
           <a:p>
@@ -6688,7 +7062,7 @@
           <a:p>
             <a:fld id="{DDF3C980-D1D7-6F46-8183-EEE40974F22F}" type="slidenum">
               <a:rPr lang="en-US" smtClean="0"/>
-              <a:t>5</a:t>
+              <a:t>4</a:t>
             </a:fld>
             <a:endParaRPr lang="en-US"/>
           </a:p>
@@ -6751,6 +7125,94 @@
           <a:bodyPr/>
           <a:lstStyle/>
           <a:p>
+            <a:pPr marL="0" marR="0" indent="0" algn="l" defTabSz="457200" rtl="0" eaLnBrk="1" fontAlgn="auto" latinLnBrk="0" hangingPunct="1">
+              <a:lnSpc>
+                <a:spcPct val="100000"/>
+              </a:lnSpc>
+              <a:spcBef>
+                <a:spcPts val="0"/>
+              </a:spcBef>
+              <a:spcAft>
+                <a:spcPts val="0"/>
+              </a:spcAft>
+              <a:buClrTx/>
+              <a:buSzTx/>
+              <a:buFontTx/>
+              <a:buNone/>
+              <a:tabLst/>
+              <a:defRPr/>
+            </a:pPr>
+            <a:r>
+              <a:rPr lang="en-US" sz="1200" kern="1200">
+                <a:solidFill>
+                  <a:schemeClr val="tx1"/>
+                </a:solidFill>
+                <a:effectLst/>
+                <a:latin typeface="+mn-lt"/>
+                <a:ea typeface="+mn-ea"/>
+                <a:cs typeface="+mn-cs"/>
+              </a:rPr>
+              <a:t>Vinh</a:t>
+            </a:r>
+          </a:p>
+          <a:p>
+            <a:pPr marL="0" marR="0" indent="0" algn="l" defTabSz="457200" rtl="0" eaLnBrk="1" fontAlgn="auto" latinLnBrk="0" hangingPunct="1">
+              <a:lnSpc>
+                <a:spcPct val="100000"/>
+              </a:lnSpc>
+              <a:spcBef>
+                <a:spcPts val="0"/>
+              </a:spcBef>
+              <a:spcAft>
+                <a:spcPts val="0"/>
+              </a:spcAft>
+              <a:buClrTx/>
+              <a:buSzTx/>
+              <a:buFontTx/>
+              <a:buNone/>
+              <a:tabLst/>
+              <a:defRPr/>
+            </a:pPr>
+            <a:endParaRPr lang="en-US" sz="1200" kern="1200">
+              <a:solidFill>
+                <a:schemeClr val="tx1"/>
+              </a:solidFill>
+              <a:effectLst/>
+              <a:latin typeface="+mn-lt"/>
+              <a:ea typeface="+mn-ea"/>
+              <a:cs typeface="+mn-cs"/>
+            </a:endParaRPr>
+          </a:p>
+          <a:p>
+            <a:pPr marL="0" marR="0" indent="0" algn="l" defTabSz="457200" rtl="0" eaLnBrk="1" fontAlgn="auto" latinLnBrk="0" hangingPunct="1">
+              <a:lnSpc>
+                <a:spcPct val="100000"/>
+              </a:lnSpc>
+              <a:spcBef>
+                <a:spcPts val="0"/>
+              </a:spcBef>
+              <a:spcAft>
+                <a:spcPts val="0"/>
+              </a:spcAft>
+              <a:buClrTx/>
+              <a:buSzTx/>
+              <a:buFontTx/>
+              <a:buNone/>
+              <a:tabLst/>
+              <a:defRPr/>
+            </a:pPr>
+            <a:r>
+              <a:rPr lang="en-US" sz="1200" kern="1200">
+                <a:solidFill>
+                  <a:schemeClr val="tx1"/>
+                </a:solidFill>
+                <a:effectLst/>
+                <a:latin typeface="+mn-lt"/>
+                <a:ea typeface="+mn-ea"/>
+                <a:cs typeface="+mn-cs"/>
+              </a:rPr>
+              <a:t>The </a:t>
+            </a:r>
             <a:r>
               <a:rPr lang="en-US" sz="1200" kern="1200" dirty="0">
                 <a:solidFill>
@@ -6761,20 +7223,55 @@
                 <a:ea typeface="+mn-ea"/>
                 <a:cs typeface="+mn-cs"/>
               </a:rPr>
-              <a:t>Global Location Number (GLN) is a type of GS1 identification key used to determine any location that needs to be identified in the supply chain. It is designed to efficiently identify physical locations, Operational locations, and Party. GLN are used for retrieving information from different entities such as hospitals, medical supplies, delivery point, warehouses, and banks. It is constructed with a13-digit numeric structure with a prefix, location reference, and check digit. GS1 Company Prefix is assigned by a GS1 Member Organization a user. Location reference is allocated by the company to a specific location. Check digit is calculated according to a standard algorithm, which helps to ensure integrity. GLNs provides companies with a method of identifying location within and outside their company to prevent duplication, complexity, and significance problems. The benefit of using GLNs is that it is unique, multi </a:t>
-            </a:r>
-            <a:r>
-              <a:rPr lang="en-US" sz="1200" kern="1200" dirty="0" err="1">
-                <a:solidFill>
-                  <a:schemeClr val="tx1"/>
-                </a:solidFill>
-                <a:effectLst/>
-                <a:latin typeface="+mn-lt"/>
-                <a:ea typeface="+mn-ea"/>
-                <a:cs typeface="+mn-cs"/>
-              </a:rPr>
-              <a:t>sectoral</a:t>
-            </a:r>
+              <a:t>Indicator Prefix Digit is used to define a grouping, or packaging level.  For instance, in Figure 2, [1] we see an example GTIN of 061414112345, let’s say this was a 2oz bag of candy corn.  Adding an indicator prefix of “1” could denote a bulk pack of 12 2oz packages, indicator prefix “2” could be used for a 24 pack, indicator prefix “3” could be a “Gross” pack (144) of 2oz candy corn packages, and so on.  If more than 8 packaging levels are needed, then a new GTIN-12 or GTIN-13 is required.  </a:t>
+            </a:r>
+          </a:p>
+          <a:p>
+            <a:pPr marL="0" marR="0" indent="0" algn="l" defTabSz="457200" rtl="0" eaLnBrk="1" fontAlgn="auto" latinLnBrk="0" hangingPunct="1">
+              <a:lnSpc>
+                <a:spcPct val="100000"/>
+              </a:lnSpc>
+              <a:spcBef>
+                <a:spcPts val="0"/>
+              </a:spcBef>
+              <a:spcAft>
+                <a:spcPts val="0"/>
+              </a:spcAft>
+              <a:buClrTx/>
+              <a:buSzTx/>
+              <a:buFontTx/>
+              <a:buNone/>
+              <a:tabLst/>
+              <a:defRPr/>
+            </a:pPr>
+            <a:endParaRPr lang="en-US" sz="1200" kern="1200" dirty="0">
+              <a:solidFill>
+                <a:schemeClr val="tx1"/>
+              </a:solidFill>
+              <a:effectLst/>
+              <a:latin typeface="+mn-lt"/>
+              <a:ea typeface="+mn-ea"/>
+              <a:cs typeface="+mn-cs"/>
+            </a:endParaRPr>
+          </a:p>
+          <a:p>
+            <a:pPr marL="0" marR="0" indent="0" algn="l" defTabSz="457200" rtl="0" eaLnBrk="1" fontAlgn="auto" latinLnBrk="0" hangingPunct="1">
+              <a:lnSpc>
+                <a:spcPct val="100000"/>
+              </a:lnSpc>
+              <a:spcBef>
+                <a:spcPts val="0"/>
+              </a:spcBef>
+              <a:spcAft>
+                <a:spcPts val="0"/>
+              </a:spcAft>
+              <a:buClrTx/>
+              <a:buSzTx/>
+              <a:buFontTx/>
+              <a:buNone/>
+              <a:tabLst/>
+              <a:defRPr/>
+            </a:pPr>
             <a:r>
               <a:rPr lang="en-US" sz="1200" kern="1200" dirty="0">
                 <a:solidFill>
@@ -6785,36 +7282,39 @@
                 <a:ea typeface="+mn-ea"/>
                 <a:cs typeface="+mn-cs"/>
               </a:rPr>
-              <a:t>, and international. </a:t>
-            </a:r>
-          </a:p>
-          <a:p>
-            <a:r>
-              <a:rPr lang="en-US" sz="1200" kern="1200" dirty="0">
-                <a:solidFill>
-                  <a:schemeClr val="tx1"/>
-                </a:solidFill>
-                <a:effectLst/>
-                <a:latin typeface="+mn-lt"/>
-                <a:ea typeface="+mn-ea"/>
-                <a:cs typeface="+mn-cs"/>
-              </a:rPr>
-              <a:t> </a:t>
-            </a:r>
-          </a:p>
-          <a:p>
-            <a:r>
-              <a:rPr lang="en-US" sz="1200" kern="1200" dirty="0">
-                <a:solidFill>
-                  <a:schemeClr val="tx1"/>
-                </a:solidFill>
-                <a:effectLst/>
-                <a:latin typeface="+mn-lt"/>
-                <a:ea typeface="+mn-ea"/>
-                <a:cs typeface="+mn-cs"/>
-              </a:rPr>
-              <a:t>A Global Location Number provides a unique and unambiguous identification of physical locations and parties used in the supply chain or participating in a business process.</a:t>
-            </a:r>
+              <a:t>Indicator prefix “9” is reserved for variable measure trade items.  Variable measure items are trade items that cannot guarantee consistent weight, size, or length due to the production process (e.g. meat, bulk cheese).</a:t>
+            </a:r>
+          </a:p>
+          <a:p>
+            <a:pPr marL="0" marR="0" indent="0" algn="l" defTabSz="457200" rtl="0" eaLnBrk="1" fontAlgn="auto" latinLnBrk="0" hangingPunct="1">
+              <a:lnSpc>
+                <a:spcPct val="100000"/>
+              </a:lnSpc>
+              <a:spcBef>
+                <a:spcPts val="0"/>
+              </a:spcBef>
+              <a:spcAft>
+                <a:spcPts val="0"/>
+              </a:spcAft>
+              <a:buClrTx/>
+              <a:buSzTx/>
+              <a:buFontTx/>
+              <a:buNone/>
+              <a:tabLst/>
+              <a:defRPr/>
+            </a:pPr>
+            <a:endParaRPr lang="en-US" sz="1200" kern="1200" dirty="0">
+              <a:solidFill>
+                <a:schemeClr val="tx1"/>
+              </a:solidFill>
+              <a:effectLst/>
+              <a:latin typeface="+mn-lt"/>
+              <a:ea typeface="+mn-ea"/>
+              <a:cs typeface="+mn-cs"/>
+            </a:endParaRPr>
+          </a:p>
+          <a:p>
+            <a:endParaRPr lang="en-US" dirty="0"/>
           </a:p>
         </p:txBody>
       </p:sp>
@@ -6835,7 +7335,7 @@
           <a:p>
             <a:fld id="{DDF3C980-D1D7-6F46-8183-EEE40974F22F}" type="slidenum">
               <a:rPr lang="en-US" smtClean="0"/>
-              <a:t>6</a:t>
+              <a:t>5</a:t>
             </a:fld>
             <a:endParaRPr lang="en-US"/>
           </a:p>
@@ -6899,6 +7399,43 @@
           <a:lstStyle/>
           <a:p>
             <a:r>
+              <a:rPr lang="en-US" sz="1200" kern="1200">
+                <a:solidFill>
+                  <a:schemeClr val="tx1"/>
+                </a:solidFill>
+                <a:effectLst/>
+                <a:latin typeface="+mn-lt"/>
+                <a:ea typeface="+mn-ea"/>
+                <a:cs typeface="+mn-cs"/>
+              </a:rPr>
+              <a:t>Vinh</a:t>
+            </a:r>
+          </a:p>
+          <a:p>
+            <a:endParaRPr lang="en-US" sz="1200" kern="1200">
+              <a:solidFill>
+                <a:schemeClr val="tx1"/>
+              </a:solidFill>
+              <a:effectLst/>
+              <a:latin typeface="+mn-lt"/>
+              <a:ea typeface="+mn-ea"/>
+              <a:cs typeface="+mn-cs"/>
+            </a:endParaRPr>
+          </a:p>
+          <a:p>
+            <a:r>
+              <a:rPr lang="en-US" sz="1200" kern="1200">
+                <a:solidFill>
+                  <a:schemeClr val="tx1"/>
+                </a:solidFill>
+                <a:effectLst/>
+                <a:latin typeface="+mn-lt"/>
+                <a:ea typeface="+mn-ea"/>
+                <a:cs typeface="+mn-cs"/>
+              </a:rPr>
+              <a:t>Global </a:t>
+            </a:r>
+            <a:r>
               <a:rPr lang="en-US" sz="1200" kern="1200" dirty="0">
                 <a:solidFill>
                   <a:schemeClr val="tx1"/>
@@ -6908,7 +7445,7 @@
                 <a:ea typeface="+mn-ea"/>
                 <a:cs typeface="+mn-cs"/>
               </a:rPr>
-              <a:t>Global Location Number (GLN) is a type of GS1 identification key used to determine any location that needs to be identified in the supply chain. It is designed to efficiently identify physical locations, Operational locations, and Party. GLN are used for retrieving information from different entities such as hospitals, medical supplies, delivery point, warehouses, and banks. It is constructed with a13-digit numeric structure with a prefix, location reference, and check digit. GS1 Company Prefix is assigned by a GS1 Member Organization a user. Location reference is allocated by the company to a specific location. Check digit is calculated according to a standard algorithm, which helps to ensure integrity. GLNs provides companies with a method of identifying location within and outside their company to prevent duplication, complexity, and significance problems. The benefit of using GLNs is that it is unique, multi </a:t>
+              <a:t>Location Number (GLN) is a type of GS1 identification key used to determine any location that needs to be identified in the supply chain. It is designed to efficiently identify physical locations, Operational locations, and Party. GLN are used for retrieving information from different entities such as hospitals, medical supplies, delivery point, warehouses, and banks. It is constructed with a13-digit numeric structure with a prefix, location reference, and check digit. GS1 Company Prefix is assigned by a GS1 Member Organization a user. Location reference is allocated by the company to a specific location. Check digit is calculated according to a standard algorithm, which helps to ensure integrity. GLNs provides companies with a method of identifying location within and outside their company to prevent duplication, complexity, and significance problems. The benefit of using GLNs is that it is unique, multi </a:t>
             </a:r>
             <a:r>
               <a:rPr lang="en-US" sz="1200" kern="1200" dirty="0" err="1">
@@ -6962,26 +7499,6 @@
               </a:rPr>
               <a:t>A Global Location Number provides a unique and unambiguous identification of physical locations and parties used in the supply chain or participating in a business process.</a:t>
             </a:r>
-          </a:p>
-          <a:p>
-            <a:pPr marL="0" marR="0" indent="0" algn="l" defTabSz="457200" rtl="0" eaLnBrk="1" fontAlgn="auto" latinLnBrk="0" hangingPunct="1">
-              <a:lnSpc>
-                <a:spcPct val="100000"/>
-              </a:lnSpc>
-              <a:spcBef>
-                <a:spcPts val="0"/>
-              </a:spcBef>
-              <a:spcAft>
-                <a:spcPts val="0"/>
-              </a:spcAft>
-              <a:buClrTx/>
-              <a:buSzTx/>
-              <a:buFontTx/>
-              <a:buNone/>
-              <a:tabLst/>
-              <a:defRPr/>
-            </a:pPr>
-            <a:endParaRPr lang="en-US" dirty="0"/>
           </a:p>
         </p:txBody>
       </p:sp>
@@ -7002,7 +7519,7 @@
           <a:p>
             <a:fld id="{DDF3C980-D1D7-6F46-8183-EEE40974F22F}" type="slidenum">
               <a:rPr lang="en-US" smtClean="0"/>
-              <a:t>7</a:t>
+              <a:t>6</a:t>
             </a:fld>
             <a:endParaRPr lang="en-US"/>
           </a:p>
@@ -7011,7 +7528,7 @@
     </p:spTree>
     <p:extLst>
       <p:ext uri="{BB962C8B-B14F-4D97-AF65-F5344CB8AC3E}">
-        <p14:creationId xmlns:p14="http://schemas.microsoft.com/office/powerpoint/2010/main" val="2963284767"/>
+        <p14:creationId xmlns:p14="http://schemas.microsoft.com/office/powerpoint/2010/main" val="4177528011"/>
       </p:ext>
     </p:extLst>
   </p:cSld>
@@ -7066,7 +7583,7 @@
           <a:lstStyle/>
           <a:p>
             <a:r>
-              <a:rPr lang="en-US" sz="1200" kern="1200" dirty="0">
+              <a:rPr lang="en-US" sz="1200" kern="1200">
                 <a:solidFill>
                   <a:schemeClr val="tx1"/>
                 </a:solidFill>
@@ -7075,93 +7592,19 @@
                 <a:ea typeface="+mn-ea"/>
                 <a:cs typeface="+mn-cs"/>
               </a:rPr>
-              <a:t>An open source GTIN subset &gt; 100K records will be downloaded and installed on a local </a:t>
-            </a:r>
-            <a:r>
-              <a:rPr lang="en-US" sz="1200" kern="1200" dirty="0" err="1">
-                <a:solidFill>
-                  <a:schemeClr val="tx1"/>
-                </a:solidFill>
-                <a:effectLst/>
-                <a:latin typeface="+mn-lt"/>
-                <a:ea typeface="+mn-ea"/>
-                <a:cs typeface="+mn-cs"/>
-              </a:rPr>
-              <a:t>mySQL</a:t>
-            </a:r>
-            <a:r>
-              <a:rPr lang="en-US" sz="1200" kern="1200" dirty="0">
-                <a:solidFill>
-                  <a:schemeClr val="tx1"/>
-                </a:solidFill>
-                <a:effectLst/>
-                <a:latin typeface="+mn-lt"/>
-                <a:ea typeface="+mn-ea"/>
-                <a:cs typeface="+mn-cs"/>
-              </a:rPr>
-              <a:t> database instance.  Open source documentation will be reviewed to better understand the GTIN data.  A graphical schema of the database will be created with example data from each table to visualize the relationship between tables.  Exploratory queries will be created to summarize selected fields such as brand, and packaging level.   A summary list of </a:t>
-            </a:r>
-            <a:r>
-              <a:rPr lang="en-US" sz="1200" kern="1200" dirty="0" err="1">
-                <a:solidFill>
-                  <a:schemeClr val="tx1"/>
-                </a:solidFill>
-                <a:effectLst/>
-                <a:latin typeface="+mn-lt"/>
-                <a:ea typeface="+mn-ea"/>
-                <a:cs typeface="+mn-cs"/>
-              </a:rPr>
-              <a:t>mySQL</a:t>
-            </a:r>
-            <a:r>
-              <a:rPr lang="en-US" sz="1200" kern="1200" dirty="0">
-                <a:solidFill>
-                  <a:schemeClr val="tx1"/>
-                </a:solidFill>
-                <a:effectLst/>
-                <a:latin typeface="+mn-lt"/>
-                <a:ea typeface="+mn-ea"/>
-                <a:cs typeface="+mn-cs"/>
-              </a:rPr>
-              <a:t> commands used in the analysis will be provided along with impressions on ease of use, intuitiveness, and effectiveness.</a:t>
-            </a:r>
-            <a:r>
-              <a:rPr lang="en-US" dirty="0">
-                <a:effectLst/>
-              </a:rPr>
-              <a:t> </a:t>
-            </a:r>
-          </a:p>
-          <a:p>
-            <a:endParaRPr lang="en-US" dirty="0">
+              <a:t>Marvin</a:t>
+            </a:r>
+          </a:p>
+          <a:p>
+            <a:endParaRPr lang="en-US" sz="1200" kern="1200">
+              <a:solidFill>
+                <a:schemeClr val="tx1"/>
+              </a:solidFill>
               <a:effectLst/>
+              <a:latin typeface="+mn-lt"/>
+              <a:ea typeface="+mn-ea"/>
+              <a:cs typeface="+mn-cs"/>
             </a:endParaRPr>
-          </a:p>
-          <a:p>
-            <a:endParaRPr lang="en-US" dirty="0">
-              <a:effectLst/>
-            </a:endParaRPr>
-          </a:p>
-          <a:p>
-            <a:r>
-              <a:rPr lang="en-US" sz="1200" kern="1200" dirty="0">
-                <a:solidFill>
-                  <a:schemeClr val="tx1"/>
-                </a:solidFill>
-                <a:effectLst/>
-                <a:latin typeface="+mn-lt"/>
-                <a:ea typeface="+mn-ea"/>
-                <a:cs typeface="+mn-cs"/>
-              </a:rPr>
-              <a:t>Thirteen tables containing 2.6 million rows were found in the POD database (see figure 6).  Example records were extracted from each table and key fields were examined to generate a schema.  See Appendix B, Figure B1.  Discrepancies from the schema in the specification file found with the POD database were resolved using key field names and matching records in the POD database.  While there were at least a few records in each table, matching records in related tables proved to be disappointing. See Appendix C, figure C1 for a summary of matching records in the 7 largest tables. Of the 2.6 million original rows, only 52 were linked between 6 tables, 0 for 7 or more tables.  The website seems to imply POD is an attempt at a global GTIN registry but it appears it may have been abandoned in early 2014, the last revision date on the database dump.</a:t>
-            </a:r>
-            <a:r>
-              <a:rPr lang="en-US" dirty="0">
-                <a:effectLst/>
-              </a:rPr>
-              <a:t> </a:t>
-            </a:r>
-            <a:endParaRPr lang="en-US" dirty="0"/>
           </a:p>
         </p:txBody>
       </p:sp>
@@ -7182,7 +7625,7 @@
           <a:p>
             <a:fld id="{DDF3C980-D1D7-6F46-8183-EEE40974F22F}" type="slidenum">
               <a:rPr lang="en-US" smtClean="0"/>
-              <a:t>8</a:t>
+              <a:t>7</a:t>
             </a:fld>
             <a:endParaRPr lang="en-US"/>
           </a:p>
@@ -7191,7 +7634,7 @@
     </p:spTree>
     <p:extLst>
       <p:ext uri="{BB962C8B-B14F-4D97-AF65-F5344CB8AC3E}">
-        <p14:creationId xmlns:p14="http://schemas.microsoft.com/office/powerpoint/2010/main" val="1652579161"/>
+        <p14:creationId xmlns:p14="http://schemas.microsoft.com/office/powerpoint/2010/main" val="2963284767"/>
       </p:ext>
     </p:extLst>
   </p:cSld>
@@ -7246,6 +7689,43 @@
           <a:lstStyle/>
           <a:p>
             <a:r>
+              <a:rPr lang="en-US" sz="1200" kern="1200">
+                <a:solidFill>
+                  <a:schemeClr val="tx1"/>
+                </a:solidFill>
+                <a:effectLst/>
+                <a:latin typeface="+mn-lt"/>
+                <a:ea typeface="+mn-ea"/>
+                <a:cs typeface="+mn-cs"/>
+              </a:rPr>
+              <a:t>Marvin</a:t>
+            </a:r>
+          </a:p>
+          <a:p>
+            <a:endParaRPr lang="en-US" sz="1200" kern="1200">
+              <a:solidFill>
+                <a:schemeClr val="tx1"/>
+              </a:solidFill>
+              <a:effectLst/>
+              <a:latin typeface="+mn-lt"/>
+              <a:ea typeface="+mn-ea"/>
+              <a:cs typeface="+mn-cs"/>
+            </a:endParaRPr>
+          </a:p>
+          <a:p>
+            <a:r>
+              <a:rPr lang="en-US" sz="1200" kern="1200">
+                <a:solidFill>
+                  <a:schemeClr val="tx1"/>
+                </a:solidFill>
+                <a:effectLst/>
+                <a:latin typeface="+mn-lt"/>
+                <a:ea typeface="+mn-ea"/>
+                <a:cs typeface="+mn-cs"/>
+              </a:rPr>
+              <a:t>An </a:t>
+            </a:r>
+            <a:r>
               <a:rPr lang="en-US" sz="1200" kern="1200" dirty="0">
                 <a:solidFill>
                   <a:schemeClr val="tx1"/>
@@ -7255,21 +7735,20 @@
                 <a:ea typeface="+mn-ea"/>
                 <a:cs typeface="+mn-cs"/>
               </a:rPr>
-              <a:t>Without Global Company Prefixes and Global Trade item numbers, it would be possible and highly likely that different companies could choose to use the same identification number (Part number) on their products.  It is hard to imagine how global trade would work without Global Trade Item Numbers and the GS1 organization in place to ensure a unique numbering system worldwide.  GS1 does not maintain a list of global trade item numbers, they just maintain the Global Company Prefixes used to ensure unique item numbers.  The Product Open Database (POD) gave an interesting peak into the detailed data related to GTIN, but it’s small size and fractured nature were disappointing.</a:t>
-            </a:r>
-          </a:p>
-          <a:p>
-            <a:endParaRPr lang="en-US" sz="1200" kern="1200" dirty="0">
-              <a:solidFill>
-                <a:schemeClr val="tx1"/>
-              </a:solidFill>
-              <a:effectLst/>
-              <a:latin typeface="+mn-lt"/>
-              <a:ea typeface="+mn-ea"/>
-              <a:cs typeface="+mn-cs"/>
-            </a:endParaRPr>
-          </a:p>
-          <a:p>
+              <a:t>open source GTIN subset &gt; 100K records will be downloaded and installed on a local </a:t>
+            </a:r>
+            <a:r>
+              <a:rPr lang="en-US" sz="1200" kern="1200" dirty="0" err="1">
+                <a:solidFill>
+                  <a:schemeClr val="tx1"/>
+                </a:solidFill>
+                <a:effectLst/>
+                <a:latin typeface="+mn-lt"/>
+                <a:ea typeface="+mn-ea"/>
+                <a:cs typeface="+mn-cs"/>
+              </a:rPr>
+              <a:t>mySQL</a:t>
+            </a:r>
             <a:r>
               <a:rPr lang="en-US" sz="1200" kern="1200" dirty="0">
                 <a:solidFill>
@@ -7280,7 +7759,67 @@
                 <a:ea typeface="+mn-ea"/>
                 <a:cs typeface="+mn-cs"/>
               </a:rPr>
-              <a:t>There are several other “Open” implementations of Global Trade Item numbers.  See Appendix A, table A2.  POD first appeared to be a complete subset but after further investigation it was found to be missing enough linked records in related tables to be very useful. </a:t>
+              <a:t> database instance.  Open source documentation will be reviewed to better understand the GTIN data.  A graphical schema of the database will be created with example data from each table to visualize the relationship between tables.  Exploratory queries will be created to summarize selected fields such as brand, and packaging level.   A summary list of </a:t>
+            </a:r>
+            <a:r>
+              <a:rPr lang="en-US" sz="1200" kern="1200" dirty="0" err="1">
+                <a:solidFill>
+                  <a:schemeClr val="tx1"/>
+                </a:solidFill>
+                <a:effectLst/>
+                <a:latin typeface="+mn-lt"/>
+                <a:ea typeface="+mn-ea"/>
+                <a:cs typeface="+mn-cs"/>
+              </a:rPr>
+              <a:t>mySQL</a:t>
+            </a:r>
+            <a:r>
+              <a:rPr lang="en-US" sz="1200" kern="1200" dirty="0">
+                <a:solidFill>
+                  <a:schemeClr val="tx1"/>
+                </a:solidFill>
+                <a:effectLst/>
+                <a:latin typeface="+mn-lt"/>
+                <a:ea typeface="+mn-ea"/>
+                <a:cs typeface="+mn-cs"/>
+              </a:rPr>
+              <a:t> commands used in the analysis will be provided along with impressions on ease of use, intuitiveness, and effectiveness.</a:t>
+            </a:r>
+            <a:r>
+              <a:rPr lang="en-US" dirty="0">
+                <a:effectLst/>
+              </a:rPr>
+              <a:t> </a:t>
+            </a:r>
+          </a:p>
+          <a:p>
+            <a:endParaRPr lang="en-US" dirty="0">
+              <a:effectLst/>
+            </a:endParaRPr>
+          </a:p>
+          <a:p>
+            <a:endParaRPr lang="en-US" dirty="0">
+              <a:effectLst/>
+            </a:endParaRPr>
+          </a:p>
+          <a:p>
+            <a:r>
+              <a:rPr lang="en-US" sz="1200" kern="1200" dirty="0">
+                <a:solidFill>
+                  <a:schemeClr val="tx1"/>
+                </a:solidFill>
+                <a:effectLst/>
+                <a:latin typeface="+mn-lt"/>
+                <a:ea typeface="+mn-ea"/>
+                <a:cs typeface="+mn-cs"/>
+              </a:rPr>
+              <a:t>Thirteen tables containing 2.6 million rows were found in the POD database (see figure 6).  Example records were extracted from each table and key fields were examined to generate a schema.  See Appendix B, Figure B1.  Discrepancies from the schema in the specification file found with the POD database were resolved using key field names and matching records in the POD database.  While there were at least a few records in each table, matching records in related tables proved to be disappointing. See Appendix C, figure C1 for a summary of matching records in the 7 largest tables. Of the 2.6 million original rows, only 52 were linked between 6 tables, 0 for 7 or more tables.  The website seems to imply POD is an attempt at a global GTIN registry but it appears it may have been abandoned in early 2014, the last revision date on the database dump.</a:t>
+            </a:r>
+            <a:r>
+              <a:rPr lang="en-US" dirty="0">
+                <a:effectLst/>
+              </a:rPr>
+              <a:t> </a:t>
             </a:r>
             <a:endParaRPr lang="en-US" dirty="0"/>
           </a:p>
@@ -7303,7 +7842,7 @@
           <a:p>
             <a:fld id="{DDF3C980-D1D7-6F46-8183-EEE40974F22F}" type="slidenum">
               <a:rPr lang="en-US" smtClean="0"/>
-              <a:t>12</a:t>
+              <a:t>9</a:t>
             </a:fld>
             <a:endParaRPr lang="en-US"/>
           </a:p>
@@ -7312,7 +7851,94 @@
     </p:spTree>
     <p:extLst>
       <p:ext uri="{BB962C8B-B14F-4D97-AF65-F5344CB8AC3E}">
-        <p14:creationId xmlns:p14="http://schemas.microsoft.com/office/powerpoint/2010/main" val="3214448215"/>
+        <p14:creationId xmlns:p14="http://schemas.microsoft.com/office/powerpoint/2010/main" val="1652579161"/>
+      </p:ext>
+    </p:extLst>
+  </p:cSld>
+  <p:clrMapOvr>
+    <a:masterClrMapping/>
+  </p:clrMapOvr>
+</p:notes>
+</file>
+
+<file path=ppt/notesSlides/notesSlide9.xml><?xml version="1.0" encoding="utf-8"?>
+<p:notes xmlns:a="http://schemas.openxmlformats.org/drawingml/2006/main" xmlns:r="http://schemas.openxmlformats.org/officeDocument/2006/relationships" xmlns:p="http://schemas.openxmlformats.org/presentationml/2006/main">
+  <p:cSld>
+    <p:spTree>
+      <p:nvGrpSpPr>
+        <p:cNvPr id="1" name=""/>
+        <p:cNvGrpSpPr/>
+        <p:nvPr/>
+      </p:nvGrpSpPr>
+      <p:grpSpPr>
+        <a:xfrm>
+          <a:off x="0" y="0"/>
+          <a:ext cx="0" cy="0"/>
+          <a:chOff x="0" y="0"/>
+          <a:chExt cx="0" cy="0"/>
+        </a:xfrm>
+      </p:grpSpPr>
+      <p:sp>
+        <p:nvSpPr>
+          <p:cNvPr id="2" name="Slide Image Placeholder 1"/>
+          <p:cNvSpPr>
+            <a:spLocks noGrp="1" noRot="1" noChangeAspect="1"/>
+          </p:cNvSpPr>
+          <p:nvPr>
+            <p:ph type="sldImg"/>
+          </p:nvPr>
+        </p:nvSpPr>
+        <p:spPr/>
+      </p:sp>
+      <p:sp>
+        <p:nvSpPr>
+          <p:cNvPr id="3" name="Notes Placeholder 2"/>
+          <p:cNvSpPr>
+            <a:spLocks noGrp="1"/>
+          </p:cNvSpPr>
+          <p:nvPr>
+            <p:ph type="body" idx="1"/>
+          </p:nvPr>
+        </p:nvSpPr>
+        <p:spPr/>
+        <p:txBody>
+          <a:bodyPr/>
+          <a:lstStyle/>
+          <a:p>
+            <a:r>
+              <a:rPr lang="en-US"/>
+              <a:t>Randy</a:t>
+            </a:r>
+          </a:p>
+        </p:txBody>
+      </p:sp>
+      <p:sp>
+        <p:nvSpPr>
+          <p:cNvPr id="4" name="Slide Number Placeholder 3"/>
+          <p:cNvSpPr>
+            <a:spLocks noGrp="1"/>
+          </p:cNvSpPr>
+          <p:nvPr>
+            <p:ph type="sldNum" sz="quarter" idx="10"/>
+          </p:nvPr>
+        </p:nvSpPr>
+        <p:spPr/>
+        <p:txBody>
+          <a:bodyPr/>
+          <a:lstStyle/>
+          <a:p>
+            <a:fld id="{DDF3C980-D1D7-6F46-8183-EEE40974F22F}" type="slidenum">
+              <a:rPr lang="en-US" smtClean="0"/>
+              <a:t>10</a:t>
+            </a:fld>
+            <a:endParaRPr lang="en-US"/>
+          </a:p>
+        </p:txBody>
+      </p:sp>
+    </p:spTree>
+    <p:extLst>
+      <p:ext uri="{BB962C8B-B14F-4D97-AF65-F5344CB8AC3E}">
+        <p14:creationId xmlns:p14="http://schemas.microsoft.com/office/powerpoint/2010/main" val="1099150820"/>
       </p:ext>
     </p:extLst>
   </p:cSld>
@@ -7511,7 +8137,7 @@
           <a:p>
             <a:fld id="{B863849D-0684-4078-AEBD-89DE94590B3D}" type="datetimeFigureOut">
               <a:rPr lang="en-US" smtClean="0"/>
-              <a:t>12/8/2016</a:t>
+              <a:t>12/10/2016</a:t>
             </a:fld>
             <a:endParaRPr lang="en-US"/>
           </a:p>
@@ -7681,7 +8307,7 @@
           <a:p>
             <a:fld id="{B863849D-0684-4078-AEBD-89DE94590B3D}" type="datetimeFigureOut">
               <a:rPr lang="en-US" smtClean="0"/>
-              <a:t>12/8/2016</a:t>
+              <a:t>12/10/2016</a:t>
             </a:fld>
             <a:endParaRPr lang="en-US"/>
           </a:p>
@@ -7871,7 +8497,7 @@
           <a:p>
             <a:fld id="{B863849D-0684-4078-AEBD-89DE94590B3D}" type="datetimeFigureOut">
               <a:rPr lang="en-US" smtClean="0"/>
-              <a:t>12/8/2016</a:t>
+              <a:t>12/10/2016</a:t>
             </a:fld>
             <a:endParaRPr lang="en-US"/>
           </a:p>
@@ -8017,7 +8643,7 @@
           <a:p>
             <a:fld id="{B863849D-0684-4078-AEBD-89DE94590B3D}" type="datetimeFigureOut">
               <a:rPr lang="en-US" smtClean="0"/>
-              <a:t>12/8/2016</a:t>
+              <a:t>12/10/2016</a:t>
             </a:fld>
             <a:endParaRPr lang="en-US"/>
           </a:p>
@@ -8285,7 +8911,7 @@
           <a:p>
             <a:fld id="{B863849D-0684-4078-AEBD-89DE94590B3D}" type="datetimeFigureOut">
               <a:rPr lang="en-US" smtClean="0"/>
-              <a:t>12/8/2016</a:t>
+              <a:t>12/10/2016</a:t>
             </a:fld>
             <a:endParaRPr lang="en-US"/>
           </a:p>
@@ -8577,7 +9203,7 @@
           <a:p>
             <a:fld id="{B863849D-0684-4078-AEBD-89DE94590B3D}" type="datetimeFigureOut">
               <a:rPr lang="en-US" smtClean="0"/>
-              <a:t>12/8/2016</a:t>
+              <a:t>12/10/2016</a:t>
             </a:fld>
             <a:endParaRPr lang="en-US"/>
           </a:p>
@@ -9012,7 +9638,7 @@
           <a:p>
             <a:fld id="{B863849D-0684-4078-AEBD-89DE94590B3D}" type="datetimeFigureOut">
               <a:rPr lang="en-US" smtClean="0"/>
-              <a:t>12/8/2016</a:t>
+              <a:t>12/10/2016</a:t>
             </a:fld>
             <a:endParaRPr lang="en-US"/>
           </a:p>
@@ -9112,7 +9738,7 @@
           <a:p>
             <a:fld id="{B863849D-0684-4078-AEBD-89DE94590B3D}" type="datetimeFigureOut">
               <a:rPr lang="en-US" smtClean="0"/>
-              <a:t>12/8/2016</a:t>
+              <a:t>12/10/2016</a:t>
             </a:fld>
             <a:endParaRPr lang="en-US"/>
           </a:p>
@@ -9225,7 +9851,7 @@
           <a:p>
             <a:fld id="{B863849D-0684-4078-AEBD-89DE94590B3D}" type="datetimeFigureOut">
               <a:rPr lang="en-US" smtClean="0"/>
-              <a:t>12/8/2016</a:t>
+              <a:t>12/10/2016</a:t>
             </a:fld>
             <a:endParaRPr lang="en-US"/>
           </a:p>
@@ -9503,7 +10129,7 @@
           <a:p>
             <a:fld id="{B863849D-0684-4078-AEBD-89DE94590B3D}" type="datetimeFigureOut">
               <a:rPr lang="en-US" smtClean="0"/>
-              <a:t>12/8/2016</a:t>
+              <a:t>12/10/2016</a:t>
             </a:fld>
             <a:endParaRPr lang="en-US"/>
           </a:p>
@@ -9767,7 +10393,7 @@
           <a:p>
             <a:fld id="{B863849D-0684-4078-AEBD-89DE94590B3D}" type="datetimeFigureOut">
               <a:rPr lang="en-US" smtClean="0"/>
-              <a:t>12/8/2016</a:t>
+              <a:t>12/10/2016</a:t>
             </a:fld>
             <a:endParaRPr lang="en-US"/>
           </a:p>
@@ -9980,7 +10606,7 @@
           <a:p>
             <a:fld id="{B863849D-0684-4078-AEBD-89DE94590B3D}" type="datetimeFigureOut">
               <a:rPr lang="en-US" smtClean="0"/>
-              <a:t>12/8/2016</a:t>
+              <a:t>12/10/2016</a:t>
             </a:fld>
             <a:endParaRPr lang="en-US"/>
           </a:p>
@@ -10528,7 +11154,7 @@
             </a:br>
             <a:r>
               <a:rPr lang="en-US" sz="2400" dirty="0">
-                <a:hlinkClick r:id="rId2"/>
+                <a:hlinkClick r:id="rId3"/>
               </a:rPr>
               <a:t>https://github.com/rlisbona/MSDS-7330-Term-Paper-1</a:t>
             </a:r>
@@ -10566,6 +11192,304 @@
           <a:chExt cx="0" cy="0"/>
         </a:xfrm>
       </p:grpSpPr>
+      <p:sp>
+        <p:nvSpPr>
+          <p:cNvPr id="2" name="Title 1"/>
+          <p:cNvSpPr>
+            <a:spLocks noGrp="1"/>
+          </p:cNvSpPr>
+          <p:nvPr>
+            <p:ph type="title"/>
+          </p:nvPr>
+        </p:nvSpPr>
+        <p:spPr>
+          <a:xfrm>
+            <a:off x="304800" y="228600"/>
+            <a:ext cx="8229600" cy="457200"/>
+          </a:xfrm>
+        </p:spPr>
+        <p:txBody>
+          <a:bodyPr/>
+          <a:lstStyle/>
+          <a:p>
+            <a:pPr algn="ctr"/>
+            <a:r>
+              <a:rPr lang="en-US" sz="2400"/>
+              <a:t>Exploratory steps</a:t>
+            </a:r>
+            <a:br>
+              <a:rPr lang="en-US" sz="2400"/>
+            </a:br>
+            <a:endParaRPr lang="en-US" sz="1200">
+              <a:latin typeface="+mn-lt"/>
+            </a:endParaRPr>
+          </a:p>
+        </p:txBody>
+      </p:sp>
+      <p:sp>
+        <p:nvSpPr>
+          <p:cNvPr id="3" name="Text Placeholder 2"/>
+          <p:cNvSpPr>
+            <a:spLocks noGrp="1"/>
+          </p:cNvSpPr>
+          <p:nvPr>
+            <p:ph type="body" idx="1"/>
+          </p:nvPr>
+        </p:nvSpPr>
+        <p:spPr>
+          <a:xfrm>
+            <a:off x="304800" y="1676400"/>
+            <a:ext cx="8001000" cy="2514600"/>
+          </a:xfrm>
+        </p:spPr>
+        <p:txBody>
+          <a:bodyPr>
+            <a:noAutofit/>
+          </a:bodyPr>
+          <a:lstStyle/>
+          <a:p>
+            <a:r>
+              <a:rPr lang="en-US" sz="2000"/>
+              <a:t>Contains example Queries to:</a:t>
+            </a:r>
+          </a:p>
+          <a:p>
+            <a:pPr marL="285750" indent="-285750">
+              <a:buFont typeface="Arial" panose="020B0604020202020204" pitchFamily="34" charset="0"/>
+              <a:buChar char="•"/>
+            </a:pPr>
+            <a:r>
+              <a:rPr lang="en-US" sz="2000"/>
+              <a:t>Count records in each table</a:t>
+            </a:r>
+          </a:p>
+          <a:p>
+            <a:pPr marL="285750" indent="-285750">
+              <a:buFont typeface="Arial" panose="020B0604020202020204" pitchFamily="34" charset="0"/>
+              <a:buChar char="•"/>
+            </a:pPr>
+            <a:r>
+              <a:rPr lang="en-US" sz="2000"/>
+              <a:t>Determine primary keys</a:t>
+            </a:r>
+          </a:p>
+          <a:p>
+            <a:pPr marL="285750" indent="-285750">
+              <a:buFont typeface="Arial" panose="020B0604020202020204" pitchFamily="34" charset="0"/>
+              <a:buChar char="•"/>
+            </a:pPr>
+            <a:r>
+              <a:rPr lang="en-US" sz="2000"/>
+              <a:t>Check for secondary indexes (none found)</a:t>
+            </a:r>
+          </a:p>
+          <a:p>
+            <a:pPr marL="285750" indent="-285750">
+              <a:buFont typeface="Arial" panose="020B0604020202020204" pitchFamily="34" charset="0"/>
+              <a:buChar char="•"/>
+            </a:pPr>
+            <a:r>
+              <a:rPr lang="en-US" sz="2000"/>
+              <a:t>Extract example records from each table</a:t>
+            </a:r>
+          </a:p>
+          <a:p>
+            <a:pPr marL="285750" indent="-285750">
+              <a:buFont typeface="Arial" panose="020B0604020202020204" pitchFamily="34" charset="0"/>
+              <a:buChar char="•"/>
+            </a:pPr>
+            <a:r>
+              <a:rPr lang="en-US" sz="2000"/>
+              <a:t>Count matching records between related tables</a:t>
+            </a:r>
+          </a:p>
+          <a:p>
+            <a:pPr marL="285750" indent="-285750">
+              <a:buFont typeface="Arial" panose="020B0604020202020204" pitchFamily="34" charset="0"/>
+              <a:buChar char="•"/>
+            </a:pPr>
+            <a:r>
+              <a:rPr lang="en-US" sz="2000"/>
+              <a:t>Queries for summary charts in the term paper</a:t>
+            </a:r>
+          </a:p>
+        </p:txBody>
+      </p:sp>
+      <p:sp>
+        <p:nvSpPr>
+          <p:cNvPr id="4" name="TextBox 3"/>
+          <p:cNvSpPr txBox="1"/>
+          <p:nvPr/>
+        </p:nvSpPr>
+        <p:spPr>
+          <a:xfrm>
+            <a:off x="152400" y="685800"/>
+            <a:ext cx="8763000" cy="892552"/>
+          </a:xfrm>
+          <a:prstGeom prst="rect">
+            <a:avLst/>
+          </a:prstGeom>
+          <a:noFill/>
+        </p:spPr>
+        <p:txBody>
+          <a:bodyPr wrap="square" rtlCol="0">
+            <a:spAutoFit/>
+          </a:bodyPr>
+          <a:lstStyle/>
+          <a:p>
+            <a:r>
+              <a:rPr lang="en-US" sz="3600"/>
+              <a:t>Exploratory mysql sourcecode:</a:t>
+            </a:r>
+            <a:br>
+              <a:rPr lang="en-US" sz="3600"/>
+            </a:br>
+            <a:r>
+              <a:rPr lang="en-US" sz="1600">
+                <a:hlinkClick r:id="rId3"/>
+              </a:rPr>
+              <a:t>https://github.com/rlisbona/MSDS-7330-Term-Paper-1/blob/master/Explore/Explore%20gtin_13.sql</a:t>
+            </a:r>
+            <a:endParaRPr lang="en-US" sz="1600"/>
+          </a:p>
+        </p:txBody>
+      </p:sp>
+      <p:pic>
+        <p:nvPicPr>
+          <p:cNvPr id="3074" name="Picture 2"/>
+          <p:cNvPicPr>
+            <a:picLocks noChangeAspect="1" noChangeArrowheads="1"/>
+          </p:cNvPicPr>
+          <p:nvPr/>
+        </p:nvPicPr>
+        <p:blipFill>
+          <a:blip r:embed="rId4">
+            <a:extLst>
+              <a:ext uri="{28A0092B-C50C-407E-A947-70E740481C1C}">
+                <a14:useLocalDpi xmlns:a14="http://schemas.microsoft.com/office/drawing/2010/main" val="0"/>
+              </a:ext>
+            </a:extLst>
+          </a:blip>
+          <a:srcRect/>
+          <a:stretch>
+            <a:fillRect/>
+          </a:stretch>
+        </p:blipFill>
+        <p:spPr bwMode="auto">
+          <a:xfrm>
+            <a:off x="685800" y="5181600"/>
+            <a:ext cx="7353300" cy="1295400"/>
+          </a:xfrm>
+          <a:prstGeom prst="rect">
+            <a:avLst/>
+          </a:prstGeom>
+          <a:noFill/>
+          <a:ln>
+            <a:noFill/>
+          </a:ln>
+          <a:extLst>
+            <a:ext uri="{909E8E84-426E-40dd-AFC4-6F175D3DCCD1}">
+              <a14:hiddenFill xmlns="" xmlns:a14="http://schemas.microsoft.com/office/drawing/2010/main">
+                <a:solidFill>
+                  <a:schemeClr val="accent1"/>
+                </a:solidFill>
+              </a14:hiddenFill>
+            </a:ext>
+            <a:ext uri="{91240B29-F687-4f45-9708-019B960494DF}">
+              <a14:hiddenLine xmlns="" xmlns:a14="http://schemas.microsoft.com/office/drawing/2010/main" w="9525">
+                <a:solidFill>
+                  <a:schemeClr val="tx1"/>
+                </a:solidFill>
+                <a:miter lim="800000"/>
+                <a:headEnd/>
+                <a:tailEnd/>
+              </a14:hiddenLine>
+            </a:ext>
+          </a:extLst>
+        </p:spPr>
+      </p:pic>
+      <p:sp>
+        <p:nvSpPr>
+          <p:cNvPr id="5" name="TextBox 4"/>
+          <p:cNvSpPr txBox="1"/>
+          <p:nvPr/>
+        </p:nvSpPr>
+        <p:spPr>
+          <a:xfrm>
+            <a:off x="1353381" y="4255627"/>
+            <a:ext cx="6361037" cy="923330"/>
+          </a:xfrm>
+          <a:prstGeom prst="rect">
+            <a:avLst/>
+          </a:prstGeom>
+          <a:noFill/>
+        </p:spPr>
+        <p:txBody>
+          <a:bodyPr wrap="none" rtlCol="0">
+            <a:spAutoFit/>
+          </a:bodyPr>
+          <a:lstStyle/>
+          <a:p>
+            <a:pPr algn="ctr"/>
+            <a:r>
+              <a:rPr lang="en-US"/>
+              <a:t>Initial exploratory queries appeared to show a lot of useful data</a:t>
+            </a:r>
+          </a:p>
+          <a:p>
+            <a:pPr algn="ctr"/>
+            <a:r>
+              <a:rPr lang="en-US">
+                <a:solidFill>
+                  <a:srgbClr val="FFFF00"/>
+                </a:solidFill>
+              </a:rPr>
+              <a:t>But linked queries showed as we added more tables, </a:t>
+            </a:r>
+          </a:p>
+          <a:p>
+            <a:pPr algn="ctr"/>
+            <a:r>
+              <a:rPr lang="en-US">
+                <a:solidFill>
+                  <a:srgbClr val="FFFF00"/>
+                </a:solidFill>
+              </a:rPr>
+              <a:t>we had fewer and fewer matching records</a:t>
+            </a:r>
+          </a:p>
+        </p:txBody>
+      </p:sp>
+    </p:spTree>
+    <p:extLst>
+      <p:ext uri="{BB962C8B-B14F-4D97-AF65-F5344CB8AC3E}">
+        <p14:creationId xmlns:p14="http://schemas.microsoft.com/office/powerpoint/2010/main" val="1025795374"/>
+      </p:ext>
+    </p:extLst>
+  </p:cSld>
+  <p:clrMapOvr>
+    <a:masterClrMapping/>
+  </p:clrMapOvr>
+</p:sld>
+</file>
+
+<file path=ppt/slides/slide11.xml><?xml version="1.0" encoding="utf-8"?>
+<p:sld xmlns:a="http://schemas.openxmlformats.org/drawingml/2006/main" xmlns:r="http://schemas.openxmlformats.org/officeDocument/2006/relationships" xmlns:p="http://schemas.openxmlformats.org/presentationml/2006/main">
+  <p:cSld>
+    <p:spTree>
+      <p:nvGrpSpPr>
+        <p:cNvPr id="1" name=""/>
+        <p:cNvGrpSpPr/>
+        <p:nvPr/>
+      </p:nvGrpSpPr>
+      <p:grpSpPr>
+        <a:xfrm>
+          <a:off x="0" y="0"/>
+          <a:ext cx="0" cy="0"/>
+          <a:chOff x="0" y="0"/>
+          <a:chExt cx="0" cy="0"/>
+        </a:xfrm>
+      </p:grpSpPr>
       <p:pic>
         <p:nvPicPr>
           <p:cNvPr id="3" name="Picture 2"/>
@@ -10575,7 +11499,7 @@
           <p:nvPr/>
         </p:nvPicPr>
         <p:blipFill>
-          <a:blip r:embed="rId2"/>
+          <a:blip r:embed="rId3"/>
           <a:stretch>
             <a:fillRect/>
           </a:stretch>
@@ -10980,7 +11904,7 @@
 </p:sld>
 </file>
 
-<file path=ppt/slides/slide11.xml><?xml version="1.0" encoding="utf-8"?>
+<file path=ppt/slides/slide12.xml><?xml version="1.0" encoding="utf-8"?>
 <p:sld xmlns:a="http://schemas.openxmlformats.org/drawingml/2006/main" xmlns:r="http://schemas.openxmlformats.org/officeDocument/2006/relationships" xmlns:p="http://schemas.openxmlformats.org/presentationml/2006/main">
   <p:cSld>
     <p:spTree>
@@ -11043,7 +11967,7 @@
           <p:nvPr/>
         </p:nvPicPr>
         <p:blipFill>
-          <a:blip r:embed="rId2"/>
+          <a:blip r:embed="rId3"/>
           <a:stretch>
             <a:fillRect/>
           </a:stretch>
@@ -11071,7 +11995,7 @@
 </p:sld>
 </file>
 
-<file path=ppt/slides/slide12.xml><?xml version="1.0" encoding="utf-8"?>
+<file path=ppt/slides/slide13.xml><?xml version="1.0" encoding="utf-8"?>
 <p:sld xmlns:a="http://schemas.openxmlformats.org/drawingml/2006/main" xmlns:r="http://schemas.openxmlformats.org/officeDocument/2006/relationships" xmlns:p="http://schemas.openxmlformats.org/presentationml/2006/main">
   <p:cSld>
     <p:spTree>
@@ -11223,6 +12147,63 @@
     <p:extLst>
       <p:ext uri="{BB962C8B-B14F-4D97-AF65-F5344CB8AC3E}">
         <p14:creationId xmlns:p14="http://schemas.microsoft.com/office/powerpoint/2010/main" val="3496632053"/>
+      </p:ext>
+    </p:extLst>
+  </p:cSld>
+  <p:clrMapOvr>
+    <a:masterClrMapping/>
+  </p:clrMapOvr>
+</p:sld>
+</file>
+
+<file path=ppt/slides/slide14.xml><?xml version="1.0" encoding="utf-8"?>
+<p:sld xmlns:a="http://schemas.openxmlformats.org/drawingml/2006/main" xmlns:r="http://schemas.openxmlformats.org/officeDocument/2006/relationships" xmlns:p="http://schemas.openxmlformats.org/presentationml/2006/main">
+  <p:cSld>
+    <p:spTree>
+      <p:nvGrpSpPr>
+        <p:cNvPr id="1" name=""/>
+        <p:cNvGrpSpPr/>
+        <p:nvPr/>
+      </p:nvGrpSpPr>
+      <p:grpSpPr>
+        <a:xfrm>
+          <a:off x="0" y="0"/>
+          <a:ext cx="0" cy="0"/>
+          <a:chOff x="0" y="0"/>
+          <a:chExt cx="0" cy="0"/>
+        </a:xfrm>
+      </p:grpSpPr>
+      <p:sp>
+        <p:nvSpPr>
+          <p:cNvPr id="2" name="Title 1"/>
+          <p:cNvSpPr>
+            <a:spLocks noGrp="1"/>
+          </p:cNvSpPr>
+          <p:nvPr>
+            <p:ph type="ctrTitle"/>
+          </p:nvPr>
+        </p:nvSpPr>
+        <p:spPr>
+          <a:xfrm>
+            <a:off x="1447800" y="609600"/>
+            <a:ext cx="6172199" cy="2251579"/>
+          </a:xfrm>
+        </p:spPr>
+        <p:txBody>
+          <a:bodyPr/>
+          <a:lstStyle/>
+          <a:p>
+            <a:r>
+              <a:rPr lang="en-US" sz="2400"/>
+              <a:t>Questions?</a:t>
+            </a:r>
+          </a:p>
+        </p:txBody>
+      </p:sp>
+    </p:spTree>
+    <p:extLst>
+      <p:ext uri="{BB962C8B-B14F-4D97-AF65-F5344CB8AC3E}">
+        <p14:creationId xmlns:p14="http://schemas.microsoft.com/office/powerpoint/2010/main" val="3107451661"/>
       </p:ext>
     </p:extLst>
   </p:cSld>
@@ -11554,14 +12535,14 @@
           </a:ln>
           <a:extLst>
             <a:ext uri="{909E8E84-426E-40dd-AFC4-6F175D3DCCD1}">
-              <a14:hiddenFill xmlns:a14="http://schemas.microsoft.com/office/drawing/2010/main" xmlns="">
+              <a14:hiddenFill xmlns="" xmlns:a14="http://schemas.microsoft.com/office/drawing/2010/main">
                 <a:solidFill>
                   <a:schemeClr val="accent1"/>
                 </a:solidFill>
               </a14:hiddenFill>
             </a:ext>
             <a:ext uri="{91240B29-F687-4f45-9708-019B960494DF}">
-              <a14:hiddenLine xmlns:a14="http://schemas.microsoft.com/office/drawing/2010/main" xmlns="" w="9525">
+              <a14:hiddenLine xmlns="" xmlns:a14="http://schemas.microsoft.com/office/drawing/2010/main" w="9525">
                 <a:solidFill>
                   <a:schemeClr val="tx1"/>
                 </a:solidFill>
@@ -11770,7 +12751,7 @@
         </p:blipFill>
         <p:spPr>
           <a:xfrm>
-            <a:off x="685800" y="1981200"/>
+            <a:off x="687730" y="1600200"/>
             <a:ext cx="7990710" cy="2667000"/>
           </a:xfrm>
           <a:prstGeom prst="rect">
@@ -11808,6 +12789,68 @@
               </a:rPr>
               <a:t>Source : GS1_General_Specifications.pdf</a:t>
             </a:r>
+          </a:p>
+        </p:txBody>
+      </p:sp>
+      <p:sp>
+        <p:nvSpPr>
+          <p:cNvPr id="4" name="TextBox 3"/>
+          <p:cNvSpPr txBox="1"/>
+          <p:nvPr/>
+        </p:nvSpPr>
+        <p:spPr>
+          <a:xfrm>
+            <a:off x="178486" y="4489523"/>
+            <a:ext cx="8334333" cy="1846659"/>
+          </a:xfrm>
+          <a:prstGeom prst="rect">
+            <a:avLst/>
+          </a:prstGeom>
+          <a:noFill/>
+        </p:spPr>
+        <p:txBody>
+          <a:bodyPr wrap="none" rtlCol="0">
+            <a:spAutoFit/>
+          </a:bodyPr>
+          <a:lstStyle/>
+          <a:p>
+            <a:pPr lvl="0"/>
+            <a:r>
+              <a:rPr lang="en-US" sz="1600"/>
+              <a:t>GTIN-8 is a truncated 8 digit - used on packages with limited label space, such as chewing gum.</a:t>
+            </a:r>
+          </a:p>
+          <a:p>
+            <a:pPr lvl="0"/>
+            <a:r>
+              <a:rPr lang="en-US" sz="1600"/>
+              <a:t>GTIN-12 is 12 digit -U.P.C. company prefix, item reference, and check digit.</a:t>
+            </a:r>
+          </a:p>
+          <a:p>
+            <a:pPr lvl="0"/>
+            <a:r>
+              <a:rPr lang="en-US" sz="1600"/>
+              <a:t>GTIN-13 is a 13 –EAN-13 ,GS1 Company prefix, item reference, and check digit</a:t>
+            </a:r>
+          </a:p>
+          <a:p>
+            <a:r>
+              <a:rPr lang="en-US" sz="1600"/>
+              <a:t>GTIN-14 is a 14 digit – add indicator digit (1-9), GS1 company prefix, item key, and check digit. </a:t>
+            </a:r>
+          </a:p>
+          <a:p>
+            <a:endParaRPr lang="en-US" sz="1600"/>
+          </a:p>
+          <a:p>
+            <a:r>
+              <a:rPr lang="en-US" sz="1600"/>
+              <a:t>GTIN’s &lt;14 characters are padded with leading zeros in the Product Open Database</a:t>
+            </a:r>
+          </a:p>
+          <a:p>
+            <a:endParaRPr lang="en-US"/>
           </a:p>
         </p:txBody>
       </p:sp>
@@ -12377,118 +13420,46 @@
           <a:chExt cx="0" cy="0"/>
         </a:xfrm>
       </p:grpSpPr>
+      <p:pic>
+        <p:nvPicPr>
+          <p:cNvPr id="3" name="Picture 2"/>
+          <p:cNvPicPr>
+            <a:picLocks noChangeAspect="1"/>
+          </p:cNvPicPr>
+          <p:nvPr/>
+        </p:nvPicPr>
+        <p:blipFill>
+          <a:blip r:embed="rId2">
+            <a:extLst>
+              <a:ext uri="{28A0092B-C50C-407E-A947-70E740481C1C}">
+                <a14:useLocalDpi xmlns:a14="http://schemas.microsoft.com/office/drawing/2010/main" val="0"/>
+              </a:ext>
+            </a:extLst>
+          </a:blip>
+          <a:stretch>
+            <a:fillRect/>
+          </a:stretch>
+        </p:blipFill>
+        <p:spPr>
+          <a:xfrm>
+            <a:off x="533400" y="1295400"/>
+            <a:ext cx="8114101" cy="5281767"/>
+          </a:xfrm>
+          <a:prstGeom prst="rect">
+            <a:avLst/>
+          </a:prstGeom>
+        </p:spPr>
+      </p:pic>
       <p:sp>
         <p:nvSpPr>
-          <p:cNvPr id="2" name="Title 1"/>
-          <p:cNvSpPr>
-            <a:spLocks noGrp="1"/>
-          </p:cNvSpPr>
-          <p:nvPr>
-            <p:ph type="title"/>
-          </p:nvPr>
-        </p:nvSpPr>
-        <p:spPr>
-          <a:xfrm>
-            <a:off x="152400" y="152400"/>
-            <a:ext cx="8763000" cy="1143000"/>
-          </a:xfrm>
-        </p:spPr>
-        <p:txBody>
-          <a:bodyPr/>
-          <a:lstStyle/>
-          <a:p>
-            <a:pPr algn="ctr"/>
-            <a:r>
-              <a:rPr lang="en-US" sz="2400"/>
-              <a:t>Product Open Data </a:t>
-            </a:r>
-            <a:br>
-              <a:rPr lang="en-US" sz="2400"/>
-            </a:br>
-            <a:r>
-              <a:rPr lang="en-US" sz="2400"/>
-              <a:t>Install on local mysql server</a:t>
-            </a:r>
-            <a:br>
-              <a:rPr lang="en-US" sz="2400"/>
-            </a:br>
-            <a:br>
-              <a:rPr lang="en-US" sz="2400">
-                <a:solidFill>
-                  <a:schemeClr val="accent6">
-                    <a:lumMod val="40000"/>
-                    <a:lumOff val="60000"/>
-                  </a:schemeClr>
-                </a:solidFill>
-              </a:rPr>
-            </a:br>
-            <a:br>
-              <a:rPr lang="en-US" sz="2400"/>
-            </a:br>
-            <a:br>
-              <a:rPr lang="en-US" sz="2400"/>
-            </a:br>
-            <a:endParaRPr lang="en-US" sz="2400" b="0">
-              <a:latin typeface="+mn-lt"/>
-            </a:endParaRPr>
-          </a:p>
-        </p:txBody>
-      </p:sp>
-      <p:sp>
-        <p:nvSpPr>
-          <p:cNvPr id="3" name="Text Placeholder 2"/>
-          <p:cNvSpPr>
-            <a:spLocks noGrp="1"/>
-          </p:cNvSpPr>
-          <p:nvPr>
-            <p:ph type="body" idx="1"/>
-          </p:nvPr>
-        </p:nvSpPr>
-        <p:spPr>
-          <a:xfrm>
-            <a:off x="1219200" y="3602082"/>
-            <a:ext cx="6172200" cy="533400"/>
-          </a:xfrm>
-        </p:spPr>
-        <p:txBody>
-          <a:bodyPr>
-            <a:noAutofit/>
-          </a:bodyPr>
-          <a:lstStyle/>
-          <a:p>
-            <a:pPr algn="ctr"/>
-            <a:r>
-              <a:rPr lang="en-US" sz="2400" b="1">
-                <a:solidFill>
-                  <a:schemeClr val="bg1"/>
-                </a:solidFill>
-              </a:rPr>
-              <a:t>Record counts and keyfields</a:t>
-            </a:r>
-          </a:p>
-          <a:p>
-            <a:pPr algn="ctr"/>
-            <a:r>
-              <a:rPr lang="en-US" sz="2400">
-                <a:solidFill>
-                  <a:schemeClr val="bg1"/>
-                </a:solidFill>
-              </a:rPr>
-              <a:t>13 tables, 2.6 M rows, 58M fields</a:t>
-            </a:r>
-          </a:p>
-        </p:txBody>
-      </p:sp>
-      <p:sp>
-        <p:nvSpPr>
-          <p:cNvPr id="7" name="TextBox 6"/>
+          <p:cNvPr id="4" name="TextBox 3"/>
           <p:cNvSpPr txBox="1"/>
           <p:nvPr/>
         </p:nvSpPr>
         <p:spPr>
           <a:xfrm>
-            <a:off x="228600" y="914400"/>
-            <a:ext cx="8624637" cy="2677656"/>
+            <a:off x="304800" y="381000"/>
+            <a:ext cx="8686800" cy="830997"/>
           </a:xfrm>
           <a:prstGeom prst="rect">
             <a:avLst/>
@@ -12501,127 +13472,72 @@
           </a:bodyPr>
           <a:lstStyle/>
           <a:p>
-            <a:r>
-              <a:rPr lang="en-US" sz="2800"/>
-              <a:t>Data Source: Product Open Data</a:t>
-            </a:r>
-            <a:br>
-              <a:rPr lang="en-US" sz="2800"/>
-            </a:br>
-            <a:r>
-              <a:rPr lang="en-US" sz="2800"/>
-              <a:t>Subset of Global Trade Item numbers and related data</a:t>
-            </a:r>
-            <a:br>
-              <a:rPr lang="en-US" sz="2800"/>
-            </a:br>
-            <a:r>
-              <a:rPr lang="en-US" sz="2800">
-                <a:solidFill>
-                  <a:schemeClr val="accent6">
-                    <a:lumMod val="40000"/>
-                    <a:lumOff val="60000"/>
-                  </a:schemeClr>
-                </a:solidFill>
-                <a:hlinkClick r:id="rId3"/>
-              </a:rPr>
-              <a:t>http://www.product-open-data.com/download/</a:t>
-            </a:r>
-            <a:endParaRPr lang="en-US" sz="2800">
-              <a:solidFill>
-                <a:schemeClr val="accent6">
-                  <a:lumMod val="40000"/>
-                  <a:lumOff val="60000"/>
-                </a:schemeClr>
-              </a:solidFill>
-            </a:endParaRPr>
-          </a:p>
-          <a:p>
-            <a:r>
-              <a:rPr lang="en-US" sz="2800">
-                <a:solidFill>
-                  <a:srgbClr val="FFFF00"/>
-                </a:solidFill>
-              </a:rPr>
-              <a:t>Download File : pod_web_2014.01.01_01.sql.gz</a:t>
-            </a:r>
-          </a:p>
-          <a:p>
-            <a:r>
-              <a:rPr lang="en-US" sz="2800">
-                <a:solidFill>
-                  <a:srgbClr val="FFFF00"/>
-                </a:solidFill>
-              </a:rPr>
-              <a:t>(58 KB zipped, 432 KB native file size) </a:t>
-            </a:r>
-          </a:p>
-          <a:p>
-            <a:r>
-              <a:rPr lang="en-US" sz="2800"/>
-              <a:t>Unzip and open/run in mySQL Community Workbench</a:t>
-            </a:r>
+            <a:pPr algn="ctr"/>
+            <a:r>
+              <a:rPr lang="en-US" sz="2400"/>
+              <a:t>% of Total record count by GS1 assigning office</a:t>
+            </a:r>
+          </a:p>
+          <a:p>
+            <a:pPr algn="ctr"/>
+            <a:r>
+              <a:rPr lang="en-US" sz="2400"/>
+              <a:t>For GTIN Company Prefixes in table “gtin”</a:t>
+            </a:r>
+            <a:endParaRPr lang="en-US" sz="2400" dirty="0"/>
           </a:p>
         </p:txBody>
       </p:sp>
-      <p:pic>
-        <p:nvPicPr>
-          <p:cNvPr id="2051" name="Picture 3"/>
-          <p:cNvPicPr>
-            <a:picLocks noChangeAspect="1" noChangeArrowheads="1"/>
-          </p:cNvPicPr>
+      <p:sp>
+        <p:nvSpPr>
+          <p:cNvPr id="5" name="TextBox 4"/>
+          <p:cNvSpPr txBox="1"/>
           <p:nvPr/>
-        </p:nvPicPr>
-        <p:blipFill>
-          <a:blip r:embed="rId4">
-            <a:extLst>
-              <a:ext uri="{28A0092B-C50C-407E-A947-70E740481C1C}">
-                <a14:useLocalDpi xmlns:a14="http://schemas.microsoft.com/office/drawing/2010/main" val="0"/>
-              </a:ext>
-            </a:extLst>
-          </a:blip>
-          <a:srcRect/>
-          <a:stretch>
-            <a:fillRect/>
-          </a:stretch>
-        </p:blipFill>
-        <p:spPr bwMode="auto">
+        </p:nvSpPr>
+        <p:spPr>
           <a:xfrm>
-            <a:off x="683293" y="4572000"/>
-            <a:ext cx="7715250" cy="2130542"/>
+            <a:off x="762000" y="2362200"/>
+            <a:ext cx="4114800" cy="2031325"/>
           </a:xfrm>
           <a:prstGeom prst="rect">
             <a:avLst/>
           </a:prstGeom>
           <a:noFill/>
-          <a:ln>
-            <a:noFill/>
-          </a:ln>
-          <a:extLst>
-            <a:ext uri="{909E8E84-426E-40dd-AFC4-6F175D3DCCD1}">
-              <a14:hiddenFill xmlns:a14="http://schemas.microsoft.com/office/drawing/2010/main" xmlns="">
-                <a:solidFill>
-                  <a:schemeClr val="accent1"/>
-                </a:solidFill>
-              </a14:hiddenFill>
-            </a:ext>
-            <a:ext uri="{91240B29-F687-4f45-9708-019B960494DF}">
-              <a14:hiddenLine xmlns:a14="http://schemas.microsoft.com/office/drawing/2010/main" xmlns="" w="9525">
-                <a:solidFill>
-                  <a:schemeClr val="tx1"/>
-                </a:solidFill>
-                <a:miter lim="800000"/>
-                <a:headEnd/>
-                <a:tailEnd/>
-              </a14:hiddenLine>
-            </a:ext>
-          </a:extLst>
         </p:spPr>
-      </p:pic>
+        <p:txBody>
+          <a:bodyPr wrap="square" rtlCol="0">
+            <a:spAutoFit/>
+          </a:bodyPr>
+          <a:lstStyle/>
+          <a:p>
+            <a:r>
+              <a:rPr lang="en-US"/>
+              <a:t>Use the 1</a:t>
+            </a:r>
+            <a:r>
+              <a:rPr lang="en-US" baseline="30000"/>
+              <a:t>st</a:t>
+            </a:r>
+            <a:r>
+              <a:rPr lang="en-US"/>
+              <a:t> 3 digits of the Global Company Prefix to lookup the GS1 office that assigned the Global Company Prefix</a:t>
+            </a:r>
+          </a:p>
+          <a:p>
+            <a:endParaRPr lang="en-US"/>
+          </a:p>
+          <a:p>
+            <a:r>
+              <a:rPr lang="en-US"/>
+              <a:t>Shows 80% of the Global Company Prefixes in the POD dataset were assigned in the USA or France.</a:t>
+            </a:r>
+          </a:p>
+        </p:txBody>
+      </p:sp>
     </p:spTree>
     <p:extLst>
       <p:ext uri="{BB962C8B-B14F-4D97-AF65-F5344CB8AC3E}">
-        <p14:creationId xmlns:p14="http://schemas.microsoft.com/office/powerpoint/2010/main" val="896132715"/>
+        <p14:creationId xmlns:p14="http://schemas.microsoft.com/office/powerpoint/2010/main" val="437032119"/>
       </p:ext>
     </p:extLst>
   </p:cSld>
@@ -12660,8 +13576,8 @@
         </p:nvSpPr>
         <p:spPr>
           <a:xfrm>
-            <a:off x="304800" y="228600"/>
-            <a:ext cx="8229600" cy="457200"/>
+            <a:off x="152400" y="152400"/>
+            <a:ext cx="8763000" cy="1143000"/>
           </a:xfrm>
         </p:spPr>
         <p:txBody>
@@ -12671,12 +13587,35 @@
             <a:pPr algn="ctr"/>
             <a:r>
               <a:rPr lang="en-US" sz="2400"/>
-              <a:t>Exploratory steps</a:t>
+              <a:t>Product Open Data </a:t>
             </a:r>
             <a:br>
               <a:rPr lang="en-US" sz="2400"/>
             </a:br>
-            <a:endParaRPr lang="en-US" sz="1200">
+            <a:r>
+              <a:rPr lang="en-US" sz="2400"/>
+              <a:t>Install on local mysql server</a:t>
+            </a:r>
+            <a:br>
+              <a:rPr lang="en-US" sz="2400"/>
+            </a:br>
+            <a:br>
+              <a:rPr lang="en-US" sz="2400">
+                <a:solidFill>
+                  <a:schemeClr val="accent6">
+                    <a:lumMod val="40000"/>
+                    <a:lumOff val="60000"/>
+                  </a:schemeClr>
+                </a:solidFill>
+              </a:rPr>
+            </a:br>
+            <a:br>
+              <a:rPr lang="en-US" sz="2400"/>
+            </a:br>
+            <a:br>
+              <a:rPr lang="en-US" sz="2400"/>
+            </a:br>
+            <a:endParaRPr lang="en-US" sz="2400" b="0">
               <a:latin typeface="+mn-lt"/>
             </a:endParaRPr>
           </a:p>
@@ -12694,8 +13633,8 @@
         </p:nvSpPr>
         <p:spPr>
           <a:xfrm>
-            <a:off x="304800" y="1676400"/>
-            <a:ext cx="8001000" cy="2514600"/>
+            <a:off x="1219200" y="3602082"/>
+            <a:ext cx="6172200" cy="533400"/>
           </a:xfrm>
         </p:spPr>
         <p:txBody>
@@ -12704,83 +13643,39 @@
           </a:bodyPr>
           <a:lstStyle/>
           <a:p>
-            <a:r>
-              <a:rPr lang="en-US" sz="2000"/>
-              <a:t>Contains example Queries to:</a:t>
-            </a:r>
-          </a:p>
-          <a:p>
-            <a:pPr marL="285750" indent="-285750">
-              <a:buFont typeface="Arial" panose="020B0604020202020204" pitchFamily="34" charset="0"/>
-              <a:buChar char="•"/>
-            </a:pPr>
-            <a:r>
-              <a:rPr lang="en-US" sz="2000"/>
-              <a:t>Count records in each table</a:t>
-            </a:r>
-          </a:p>
-          <a:p>
-            <a:pPr marL="285750" indent="-285750">
-              <a:buFont typeface="Arial" panose="020B0604020202020204" pitchFamily="34" charset="0"/>
-              <a:buChar char="•"/>
-            </a:pPr>
-            <a:r>
-              <a:rPr lang="en-US" sz="2000"/>
-              <a:t>Determine primary keys</a:t>
-            </a:r>
-          </a:p>
-          <a:p>
-            <a:pPr marL="285750" indent="-285750">
-              <a:buFont typeface="Arial" panose="020B0604020202020204" pitchFamily="34" charset="0"/>
-              <a:buChar char="•"/>
-            </a:pPr>
-            <a:r>
-              <a:rPr lang="en-US" sz="2000"/>
-              <a:t>Check for secondary indexes (none found)</a:t>
-            </a:r>
-          </a:p>
-          <a:p>
-            <a:pPr marL="285750" indent="-285750">
-              <a:buFont typeface="Arial" panose="020B0604020202020204" pitchFamily="34" charset="0"/>
-              <a:buChar char="•"/>
-            </a:pPr>
-            <a:r>
-              <a:rPr lang="en-US" sz="2000"/>
-              <a:t>Extract example records from each table</a:t>
-            </a:r>
-          </a:p>
-          <a:p>
-            <a:pPr marL="285750" indent="-285750">
-              <a:buFont typeface="Arial" panose="020B0604020202020204" pitchFamily="34" charset="0"/>
-              <a:buChar char="•"/>
-            </a:pPr>
-            <a:r>
-              <a:rPr lang="en-US" sz="2000"/>
-              <a:t>Count matching records between related tables</a:t>
-            </a:r>
-          </a:p>
-          <a:p>
-            <a:pPr marL="285750" indent="-285750">
-              <a:buFont typeface="Arial" panose="020B0604020202020204" pitchFamily="34" charset="0"/>
-              <a:buChar char="•"/>
-            </a:pPr>
-            <a:r>
-              <a:rPr lang="en-US" sz="2000"/>
-              <a:t>Queries for summary charts in the term paper</a:t>
+            <a:pPr algn="ctr"/>
+            <a:r>
+              <a:rPr lang="en-US" sz="2400" b="1">
+                <a:solidFill>
+                  <a:schemeClr val="bg1"/>
+                </a:solidFill>
+              </a:rPr>
+              <a:t>Record counts and keyfields</a:t>
+            </a:r>
+          </a:p>
+          <a:p>
+            <a:pPr algn="ctr"/>
+            <a:r>
+              <a:rPr lang="en-US" sz="2400">
+                <a:solidFill>
+                  <a:schemeClr val="bg1"/>
+                </a:solidFill>
+              </a:rPr>
+              <a:t>13 tables, 2.6 M rows, 58M fields</a:t>
             </a:r>
           </a:p>
         </p:txBody>
       </p:sp>
       <p:sp>
         <p:nvSpPr>
-          <p:cNvPr id="4" name="TextBox 3"/>
+          <p:cNvPr id="7" name="TextBox 6"/>
           <p:cNvSpPr txBox="1"/>
           <p:nvPr/>
         </p:nvSpPr>
         <p:spPr>
           <a:xfrm>
-            <a:off x="152400" y="685800"/>
-            <a:ext cx="8763000" cy="892552"/>
+            <a:off x="228600" y="914400"/>
+            <a:ext cx="8624637" cy="2677656"/>
           </a:xfrm>
           <a:prstGeom prst="rect">
             <a:avLst/>
@@ -12794,32 +13689,78 @@
           <a:lstStyle/>
           <a:p>
             <a:r>
-              <a:rPr lang="en-US" sz="3600"/>
-              <a:t>Exploratory mysql sourcecode:</a:t>
+              <a:rPr lang="en-US" sz="2800"/>
+              <a:t>Data Source: Product Open Data</a:t>
             </a:r>
             <a:br>
-              <a:rPr lang="en-US" sz="3600"/>
+              <a:rPr lang="en-US" sz="2800"/>
             </a:br>
             <a:r>
-              <a:rPr lang="en-US" sz="1600">
-                <a:hlinkClick r:id="rId2"/>
+              <a:rPr lang="en-US" sz="2800"/>
+              <a:t>Subset of Global Trade Item numbers and related data</a:t>
+            </a:r>
+            <a:br>
+              <a:rPr lang="en-US" sz="2800"/>
+            </a:br>
+            <a:r>
+              <a:rPr lang="en-US" sz="2800">
+                <a:solidFill>
+                  <a:schemeClr val="accent6">
+                    <a:lumMod val="40000"/>
+                    <a:lumOff val="60000"/>
+                  </a:schemeClr>
+                </a:solidFill>
+                <a:hlinkClick r:id="rId3"/>
               </a:rPr>
-              <a:t>https://github.com/rlisbona/MSDS-7330-Term-Paper-1/blob/master/Explore/Explore%20gtin_13.sql</a:t>
-            </a:r>
-            <a:endParaRPr lang="en-US" sz="1600"/>
+              <a:t>http://www.product-open-data.com/download/</a:t>
+            </a:r>
+            <a:endParaRPr lang="en-US" sz="2800">
+              <a:solidFill>
+                <a:schemeClr val="accent6">
+                  <a:lumMod val="40000"/>
+                  <a:lumOff val="60000"/>
+                </a:schemeClr>
+              </a:solidFill>
+            </a:endParaRPr>
+          </a:p>
+          <a:p>
+            <a:r>
+              <a:rPr lang="en-US" sz="2800">
+                <a:solidFill>
+                  <a:srgbClr val="FFFF00"/>
+                </a:solidFill>
+              </a:rPr>
+              <a:t>Download File : pod_web_2014.01.01_01.sql.gz</a:t>
+            </a:r>
+          </a:p>
+          <a:p>
+            <a:r>
+              <a:rPr lang="en-US" sz="2800">
+                <a:solidFill>
+                  <a:srgbClr val="FFFF00"/>
+                </a:solidFill>
+              </a:rPr>
+              <a:t>(58 KB zipped, 432 KB native file size) </a:t>
+            </a:r>
+          </a:p>
+          <a:p>
+            <a:r>
+              <a:rPr lang="en-US" sz="2800"/>
+              <a:t>Unzip and open/run in mySQL Community Workbench</a:t>
+            </a:r>
           </a:p>
         </p:txBody>
       </p:sp>
       <p:pic>
         <p:nvPicPr>
-          <p:cNvPr id="3074" name="Picture 2"/>
+          <p:cNvPr id="2051" name="Picture 3"/>
           <p:cNvPicPr>
             <a:picLocks noChangeAspect="1" noChangeArrowheads="1"/>
           </p:cNvPicPr>
           <p:nvPr/>
         </p:nvPicPr>
         <p:blipFill>
-          <a:blip r:embed="rId3">
+          <a:blip r:embed="rId4">
             <a:extLst>
               <a:ext uri="{28A0092B-C50C-407E-A947-70E740481C1C}">
                 <a14:useLocalDpi xmlns:a14="http://schemas.microsoft.com/office/drawing/2010/main" val="0"/>
@@ -12833,8 +13774,8 @@
         </p:blipFill>
         <p:spPr bwMode="auto">
           <a:xfrm>
-            <a:off x="685800" y="5181600"/>
-            <a:ext cx="7353300" cy="1295400"/>
+            <a:off x="683293" y="4572000"/>
+            <a:ext cx="7715250" cy="2130542"/>
           </a:xfrm>
           <a:prstGeom prst="rect">
             <a:avLst/>
@@ -12845,14 +13786,14 @@
           </a:ln>
           <a:extLst>
             <a:ext uri="{909E8E84-426E-40dd-AFC4-6F175D3DCCD1}">
-              <a14:hiddenFill xmlns:a14="http://schemas.microsoft.com/office/drawing/2010/main" xmlns="">
+              <a14:hiddenFill xmlns="" xmlns:a14="http://schemas.microsoft.com/office/drawing/2010/main">
                 <a:solidFill>
                   <a:schemeClr val="accent1"/>
                 </a:solidFill>
               </a14:hiddenFill>
             </a:ext>
             <a:ext uri="{91240B29-F687-4f45-9708-019B960494DF}">
-              <a14:hiddenLine xmlns:a14="http://schemas.microsoft.com/office/drawing/2010/main" xmlns="" w="9525">
+              <a14:hiddenLine xmlns="" xmlns:a14="http://schemas.microsoft.com/office/drawing/2010/main" w="9525">
                 <a:solidFill>
                   <a:schemeClr val="tx1"/>
                 </a:solidFill>
@@ -12864,62 +13805,10 @@
           </a:extLst>
         </p:spPr>
       </p:pic>
-      <p:sp>
-        <p:nvSpPr>
-          <p:cNvPr id="5" name="TextBox 4"/>
-          <p:cNvSpPr txBox="1"/>
-          <p:nvPr/>
-        </p:nvSpPr>
-        <p:spPr>
-          <a:xfrm>
-            <a:off x="1353381" y="4255627"/>
-            <a:ext cx="6361037" cy="923330"/>
-          </a:xfrm>
-          <a:prstGeom prst="rect">
-            <a:avLst/>
-          </a:prstGeom>
-          <a:noFill/>
-        </p:spPr>
-        <p:txBody>
-          <a:bodyPr wrap="none" rtlCol="0">
-            <a:spAutoFit/>
-          </a:bodyPr>
-          <a:lstStyle/>
-          <a:p>
-            <a:pPr algn="ctr"/>
-            <a:r>
-              <a:rPr lang="en-US"/>
-              <a:t>Initial exploratory queries appeared to show a lot of useful data</a:t>
-            </a:r>
-          </a:p>
-          <a:p>
-            <a:pPr algn="ctr"/>
-            <a:r>
-              <a:rPr lang="en-US">
-                <a:solidFill>
-                  <a:srgbClr val="FFFF00"/>
-                </a:solidFill>
-              </a:rPr>
-              <a:t>But linked queries showed as we added more tables, </a:t>
-            </a:r>
-          </a:p>
-          <a:p>
-            <a:pPr algn="ctr"/>
-            <a:r>
-              <a:rPr lang="en-US">
-                <a:solidFill>
-                  <a:srgbClr val="FFFF00"/>
-                </a:solidFill>
-              </a:rPr>
-              <a:t>we had fewer and fewer matching records</a:t>
-            </a:r>
-          </a:p>
-        </p:txBody>
-      </p:sp>
     </p:spTree>
     <p:extLst>
       <p:ext uri="{BB962C8B-B14F-4D97-AF65-F5344CB8AC3E}">
-        <p14:creationId xmlns:p14="http://schemas.microsoft.com/office/powerpoint/2010/main" val="1025795374"/>
+        <p14:creationId xmlns:p14="http://schemas.microsoft.com/office/powerpoint/2010/main" val="896132715"/>
       </p:ext>
     </p:extLst>
   </p:cSld>

</xml_diff>